<commit_message>
fixed num-episodes api bug
</commit_message>
<xml_diff>
--- a/work process/Block.pptx
+++ b/work process/Block.pptx
@@ -6,6 +6,7 @@
   </p:sldMasterIdLst>
   <p:sldIdLst>
     <p:sldId id="256" r:id="rId2"/>
+    <p:sldId id="257" r:id="rId3"/>
   </p:sldIdLst>
   <p:sldSz cx="12192000" cy="6858000"/>
   <p:notesSz cx="6858000" cy="9144000"/>
@@ -112,6 +113,18 @@
 </p:presentation>
 </file>
 
+<file path=ppt/commentAuthors.xml><?xml version="1.0" encoding="utf-8"?>
+<p:cmAuthorLst xmlns:a="http://schemas.openxmlformats.org/drawingml/2006/main" xmlns:r="http://schemas.openxmlformats.org/officeDocument/2006/relationships" xmlns:p="http://schemas.openxmlformats.org/presentationml/2006/main">
+  <p:cmAuthor id="1" name="Shahar Gottlieb" initials="SG" lastIdx="1" clrIdx="0">
+    <p:extLst>
+      <p:ext uri="{19B8F6BF-5375-455C-9EA6-DF929625EA0E}">
+        <p15:presenceInfo xmlns:p15="http://schemas.microsoft.com/office/powerpoint/2012/main" userId="Shahar Gottlieb" providerId="None"/>
+      </p:ext>
+    </p:extLst>
+  </p:cmAuthor>
+</p:cmAuthorLst>
+</file>
+
 <file path=ppt/slideLayouts/slideLayout1.xml><?xml version="1.0" encoding="utf-8"?>
 <p:sldLayout xmlns:a="http://schemas.openxmlformats.org/drawingml/2006/main" xmlns:r="http://schemas.openxmlformats.org/officeDocument/2006/relationships" xmlns:p="http://schemas.openxmlformats.org/presentationml/2006/main" type="title" preserve="1">
   <p:cSld name="Title Slide">
@@ -261,7 +274,7 @@
           <a:p>
             <a:fld id="{B2CAAB0F-4F60-43B7-892B-8CEC79363698}" type="datetimeFigureOut">
               <a:rPr lang="he-IL" smtClean="0"/>
-              <a:t>ב'/תשרי/תש"פ</a:t>
+              <a:t>ז'/טבת/תש"פ</a:t>
             </a:fld>
             <a:endParaRPr lang="he-IL"/>
           </a:p>
@@ -461,7 +474,7 @@
           <a:p>
             <a:fld id="{B2CAAB0F-4F60-43B7-892B-8CEC79363698}" type="datetimeFigureOut">
               <a:rPr lang="he-IL" smtClean="0"/>
-              <a:t>ב'/תשרי/תש"פ</a:t>
+              <a:t>ז'/טבת/תש"פ</a:t>
             </a:fld>
             <a:endParaRPr lang="he-IL"/>
           </a:p>
@@ -671,7 +684,7 @@
           <a:p>
             <a:fld id="{B2CAAB0F-4F60-43B7-892B-8CEC79363698}" type="datetimeFigureOut">
               <a:rPr lang="he-IL" smtClean="0"/>
-              <a:t>ב'/תשרי/תש"פ</a:t>
+              <a:t>ז'/טבת/תש"פ</a:t>
             </a:fld>
             <a:endParaRPr lang="he-IL"/>
           </a:p>
@@ -871,7 +884,7 @@
           <a:p>
             <a:fld id="{B2CAAB0F-4F60-43B7-892B-8CEC79363698}" type="datetimeFigureOut">
               <a:rPr lang="he-IL" smtClean="0"/>
-              <a:t>ב'/תשרי/תש"פ</a:t>
+              <a:t>ז'/טבת/תש"פ</a:t>
             </a:fld>
             <a:endParaRPr lang="he-IL"/>
           </a:p>
@@ -1147,7 +1160,7 @@
           <a:p>
             <a:fld id="{B2CAAB0F-4F60-43B7-892B-8CEC79363698}" type="datetimeFigureOut">
               <a:rPr lang="he-IL" smtClean="0"/>
-              <a:t>ב'/תשרי/תש"פ</a:t>
+              <a:t>ז'/טבת/תש"פ</a:t>
             </a:fld>
             <a:endParaRPr lang="he-IL"/>
           </a:p>
@@ -1415,7 +1428,7 @@
           <a:p>
             <a:fld id="{B2CAAB0F-4F60-43B7-892B-8CEC79363698}" type="datetimeFigureOut">
               <a:rPr lang="he-IL" smtClean="0"/>
-              <a:t>ב'/תשרי/תש"פ</a:t>
+              <a:t>ז'/טבת/תש"פ</a:t>
             </a:fld>
             <a:endParaRPr lang="he-IL"/>
           </a:p>
@@ -1830,7 +1843,7 @@
           <a:p>
             <a:fld id="{B2CAAB0F-4F60-43B7-892B-8CEC79363698}" type="datetimeFigureOut">
               <a:rPr lang="he-IL" smtClean="0"/>
-              <a:t>ב'/תשרי/תש"פ</a:t>
+              <a:t>ז'/טבת/תש"פ</a:t>
             </a:fld>
             <a:endParaRPr lang="he-IL"/>
           </a:p>
@@ -1972,7 +1985,7 @@
           <a:p>
             <a:fld id="{B2CAAB0F-4F60-43B7-892B-8CEC79363698}" type="datetimeFigureOut">
               <a:rPr lang="he-IL" smtClean="0"/>
-              <a:t>ב'/תשרי/תש"פ</a:t>
+              <a:t>ז'/טבת/תש"פ</a:t>
             </a:fld>
             <a:endParaRPr lang="he-IL"/>
           </a:p>
@@ -2085,7 +2098,7 @@
           <a:p>
             <a:fld id="{B2CAAB0F-4F60-43B7-892B-8CEC79363698}" type="datetimeFigureOut">
               <a:rPr lang="he-IL" smtClean="0"/>
-              <a:t>ב'/תשרי/תש"פ</a:t>
+              <a:t>ז'/טבת/תש"פ</a:t>
             </a:fld>
             <a:endParaRPr lang="he-IL"/>
           </a:p>
@@ -2398,7 +2411,7 @@
           <a:p>
             <a:fld id="{B2CAAB0F-4F60-43B7-892B-8CEC79363698}" type="datetimeFigureOut">
               <a:rPr lang="he-IL" smtClean="0"/>
-              <a:t>ב'/תשרי/תש"פ</a:t>
+              <a:t>ז'/טבת/תש"פ</a:t>
             </a:fld>
             <a:endParaRPr lang="he-IL"/>
           </a:p>
@@ -2687,7 +2700,7 @@
           <a:p>
             <a:fld id="{B2CAAB0F-4F60-43B7-892B-8CEC79363698}" type="datetimeFigureOut">
               <a:rPr lang="he-IL" smtClean="0"/>
-              <a:t>ב'/תשרי/תש"פ</a:t>
+              <a:t>ז'/טבת/תש"פ</a:t>
             </a:fld>
             <a:endParaRPr lang="he-IL"/>
           </a:p>
@@ -2930,7 +2943,7 @@
           <a:p>
             <a:fld id="{B2CAAB0F-4F60-43B7-892B-8CEC79363698}" type="datetimeFigureOut">
               <a:rPr lang="he-IL" smtClean="0"/>
-              <a:t>ב'/תשרי/תש"פ</a:t>
+              <a:t>ז'/טבת/תש"פ</a:t>
             </a:fld>
             <a:endParaRPr lang="he-IL"/>
           </a:p>
@@ -3349,10 +3362,10 @@
       </p:grpSpPr>
       <p:grpSp>
         <p:nvGrpSpPr>
-          <p:cNvPr id="16" name="Group 15">
+          <p:cNvPr id="31" name="Group 30">
             <a:extLst>
               <a:ext uri="{FF2B5EF4-FFF2-40B4-BE49-F238E27FC236}">
-                <a16:creationId xmlns:a16="http://schemas.microsoft.com/office/drawing/2014/main" id="{BD1AE167-BA82-45C6-B420-76A8E1AC0354}"/>
+                <a16:creationId xmlns:a16="http://schemas.microsoft.com/office/drawing/2014/main" id="{521EDD5F-D0BD-4B6E-8455-EC25EA791AF2}"/>
               </a:ext>
             </a:extLst>
           </p:cNvPr>
@@ -3361,18 +3374,18 @@
         </p:nvGrpSpPr>
         <p:grpSpPr>
           <a:xfrm>
-            <a:off x="483262" y="723869"/>
-            <a:ext cx="11068378" cy="4024300"/>
-            <a:chOff x="483262" y="723869"/>
-            <a:chExt cx="11068378" cy="4024300"/>
+            <a:off x="547058" y="740893"/>
+            <a:ext cx="10829780" cy="3879685"/>
+            <a:chOff x="121755" y="964177"/>
+            <a:chExt cx="10829780" cy="3879685"/>
           </a:xfrm>
         </p:grpSpPr>
         <p:grpSp>
           <p:nvGrpSpPr>
-            <p:cNvPr id="46" name="Group 45">
+            <p:cNvPr id="16" name="Group 15">
               <a:extLst>
                 <a:ext uri="{FF2B5EF4-FFF2-40B4-BE49-F238E27FC236}">
-                  <a16:creationId xmlns:a16="http://schemas.microsoft.com/office/drawing/2014/main" id="{C07C7ADF-0EA9-4D66-B788-86CC39832EFA}"/>
+                  <a16:creationId xmlns:a16="http://schemas.microsoft.com/office/drawing/2014/main" id="{BD1AE167-BA82-45C6-B420-76A8E1AC0354}"/>
                 </a:ext>
               </a:extLst>
             </p:cNvPr>
@@ -3381,18 +3394,621 @@
           </p:nvGrpSpPr>
           <p:grpSpPr>
             <a:xfrm>
-              <a:off x="483262" y="723869"/>
-              <a:ext cx="11068378" cy="4024300"/>
-              <a:chOff x="483262" y="723869"/>
-              <a:chExt cx="11068378" cy="4024300"/>
+              <a:off x="121755" y="964177"/>
+              <a:ext cx="10829780" cy="3879685"/>
+              <a:chOff x="483262" y="868484"/>
+              <a:chExt cx="11256250" cy="3879685"/>
             </a:xfrm>
           </p:grpSpPr>
+          <p:grpSp>
+            <p:nvGrpSpPr>
+              <p:cNvPr id="46" name="Group 45">
+                <a:extLst>
+                  <a:ext uri="{FF2B5EF4-FFF2-40B4-BE49-F238E27FC236}">
+                    <a16:creationId xmlns:a16="http://schemas.microsoft.com/office/drawing/2014/main" id="{C07C7ADF-0EA9-4D66-B788-86CC39832EFA}"/>
+                  </a:ext>
+                </a:extLst>
+              </p:cNvPr>
+              <p:cNvGrpSpPr/>
+              <p:nvPr/>
+            </p:nvGrpSpPr>
+            <p:grpSpPr>
+              <a:xfrm>
+                <a:off x="483262" y="868484"/>
+                <a:ext cx="11256250" cy="3879685"/>
+                <a:chOff x="483262" y="868484"/>
+                <a:chExt cx="11256250" cy="3879685"/>
+              </a:xfrm>
+            </p:grpSpPr>
+            <p:sp>
+              <p:nvSpPr>
+                <p:cNvPr id="5" name="TextBox 4">
+                  <a:extLst>
+                    <a:ext uri="{FF2B5EF4-FFF2-40B4-BE49-F238E27FC236}">
+                      <a16:creationId xmlns:a16="http://schemas.microsoft.com/office/drawing/2014/main" id="{E368FD6D-2DA4-4EB3-BB5F-2B347845FF5B}"/>
+                    </a:ext>
+                  </a:extLst>
+                </p:cNvPr>
+                <p:cNvSpPr txBox="1"/>
+                <p:nvPr/>
+              </p:nvSpPr>
+              <p:spPr>
+                <a:xfrm>
+                  <a:off x="2159898" y="1802270"/>
+                  <a:ext cx="1212191" cy="646331"/>
+                </a:xfrm>
+                <a:prstGeom prst="rect">
+                  <a:avLst/>
+                </a:prstGeom>
+                <a:noFill/>
+                <a:ln>
+                  <a:noFill/>
+                </a:ln>
+              </p:spPr>
+              <p:txBody>
+                <a:bodyPr wrap="none" rtlCol="1">
+                  <a:spAutoFit/>
+                </a:bodyPr>
+                <a:lstStyle/>
+                <a:p>
+                  <a:r>
+                    <a:rPr lang="en-US" dirty="0"/>
+                    <a:t>Unity build</a:t>
+                  </a:r>
+                </a:p>
+                <a:p>
+                  <a:endParaRPr lang="he-IL" dirty="0"/>
+                </a:p>
+              </p:txBody>
+            </p:sp>
+            <p:sp>
+              <p:nvSpPr>
+                <p:cNvPr id="6" name="TextBox 5">
+                  <a:extLst>
+                    <a:ext uri="{FF2B5EF4-FFF2-40B4-BE49-F238E27FC236}">
+                      <a16:creationId xmlns:a16="http://schemas.microsoft.com/office/drawing/2014/main" id="{334A3AD7-4E40-49BC-A429-C14BB2EEFD41}"/>
+                    </a:ext>
+                  </a:extLst>
+                </p:cNvPr>
+                <p:cNvSpPr txBox="1"/>
+                <p:nvPr/>
+              </p:nvSpPr>
+              <p:spPr>
+                <a:xfrm>
+                  <a:off x="1417358" y="2784976"/>
+                  <a:ext cx="1693220" cy="646331"/>
+                </a:xfrm>
+                <a:prstGeom prst="rect">
+                  <a:avLst/>
+                </a:prstGeom>
+                <a:noFill/>
+                <a:ln>
+                  <a:solidFill>
+                    <a:schemeClr val="tx1"/>
+                  </a:solidFill>
+                </a:ln>
+              </p:spPr>
+              <p:txBody>
+                <a:bodyPr wrap="none" rtlCol="1">
+                  <a:spAutoFit/>
+                </a:bodyPr>
+                <a:lstStyle/>
+                <a:p>
+                  <a:r>
+                    <a:rPr lang="en-US" dirty="0"/>
+                    <a:t>ml-agent toolkit</a:t>
+                  </a:r>
+                </a:p>
+                <a:p>
+                  <a:endParaRPr lang="he-IL" dirty="0"/>
+                </a:p>
+              </p:txBody>
+            </p:sp>
+            <p:sp>
+              <p:nvSpPr>
+                <p:cNvPr id="7" name="TextBox 6">
+                  <a:extLst>
+                    <a:ext uri="{FF2B5EF4-FFF2-40B4-BE49-F238E27FC236}">
+                      <a16:creationId xmlns:a16="http://schemas.microsoft.com/office/drawing/2014/main" id="{00B5900F-99C7-406A-B711-AEE0E822B8EF}"/>
+                    </a:ext>
+                  </a:extLst>
+                </p:cNvPr>
+                <p:cNvSpPr txBox="1"/>
+                <p:nvPr/>
+              </p:nvSpPr>
+              <p:spPr>
+                <a:xfrm>
+                  <a:off x="6305845" y="1992801"/>
+                  <a:ext cx="1695657" cy="923330"/>
+                </a:xfrm>
+                <a:prstGeom prst="rect">
+                  <a:avLst/>
+                </a:prstGeom>
+                <a:noFill/>
+                <a:ln>
+                  <a:solidFill>
+                    <a:schemeClr val="tx1"/>
+                  </a:solidFill>
+                </a:ln>
+              </p:spPr>
+              <p:txBody>
+                <a:bodyPr wrap="none" rtlCol="1">
+                  <a:spAutoFit/>
+                </a:bodyPr>
+                <a:lstStyle/>
+                <a:p>
+                  <a:r>
+                    <a:rPr lang="en-US" dirty="0"/>
+                    <a:t>Python wrapper</a:t>
+                  </a:r>
+                </a:p>
+                <a:p>
+                  <a:r>
+                    <a:rPr lang="en-US" dirty="0"/>
+                    <a:t>Test/train</a:t>
+                  </a:r>
+                </a:p>
+                <a:p>
+                  <a:endParaRPr lang="he-IL" dirty="0"/>
+                </a:p>
+              </p:txBody>
+            </p:sp>
+            <p:sp>
+              <p:nvSpPr>
+                <p:cNvPr id="8" name="TextBox 7">
+                  <a:extLst>
+                    <a:ext uri="{FF2B5EF4-FFF2-40B4-BE49-F238E27FC236}">
+                      <a16:creationId xmlns:a16="http://schemas.microsoft.com/office/drawing/2014/main" id="{2059467D-BB16-4E0E-A4D9-E1BD12557115}"/>
+                    </a:ext>
+                  </a:extLst>
+                </p:cNvPr>
+                <p:cNvSpPr txBox="1"/>
+                <p:nvPr/>
+              </p:nvSpPr>
+              <p:spPr>
+                <a:xfrm>
+                  <a:off x="3908334" y="2345162"/>
+                  <a:ext cx="1311641" cy="923330"/>
+                </a:xfrm>
+                <a:prstGeom prst="rect">
+                  <a:avLst/>
+                </a:prstGeom>
+                <a:noFill/>
+                <a:ln>
+                  <a:solidFill>
+                    <a:schemeClr val="tx1"/>
+                  </a:solidFill>
+                </a:ln>
+              </p:spPr>
+              <p:txBody>
+                <a:bodyPr wrap="none" rtlCol="1">
+                  <a:spAutoFit/>
+                </a:bodyPr>
+                <a:lstStyle/>
+                <a:p>
+                  <a:r>
+                    <a:rPr lang="en-US" dirty="0"/>
+                    <a:t>ML-agent </a:t>
+                  </a:r>
+                </a:p>
+                <a:p>
+                  <a:r>
+                    <a:rPr lang="en-US" dirty="0"/>
+                    <a:t>Brain object</a:t>
+                  </a:r>
+                </a:p>
+                <a:p>
+                  <a:endParaRPr lang="he-IL" dirty="0"/>
+                </a:p>
+              </p:txBody>
+            </p:sp>
+            <p:sp>
+              <p:nvSpPr>
+                <p:cNvPr id="9" name="TextBox 8">
+                  <a:extLst>
+                    <a:ext uri="{FF2B5EF4-FFF2-40B4-BE49-F238E27FC236}">
+                      <a16:creationId xmlns:a16="http://schemas.microsoft.com/office/drawing/2014/main" id="{4D51F39D-E2BE-4F52-A9C6-FCA98CC87FE9}"/>
+                    </a:ext>
+                  </a:extLst>
+                </p:cNvPr>
+                <p:cNvSpPr txBox="1"/>
+                <p:nvPr/>
+              </p:nvSpPr>
+              <p:spPr>
+                <a:xfrm>
+                  <a:off x="671797" y="3955598"/>
+                  <a:ext cx="2156424" cy="646331"/>
+                </a:xfrm>
+                <a:prstGeom prst="rect">
+                  <a:avLst/>
+                </a:prstGeom>
+                <a:noFill/>
+                <a:ln>
+                  <a:solidFill>
+                    <a:schemeClr val="tx1"/>
+                  </a:solidFill>
+                </a:ln>
+              </p:spPr>
+              <p:txBody>
+                <a:bodyPr wrap="none" rtlCol="1">
+                  <a:spAutoFit/>
+                </a:bodyPr>
+                <a:lstStyle/>
+                <a:p>
+                  <a:r>
+                    <a:rPr lang="en-US" dirty="0"/>
+                    <a:t>Unity Graphic engine</a:t>
+                  </a:r>
+                </a:p>
+                <a:p>
+                  <a:endParaRPr lang="he-IL" dirty="0"/>
+                </a:p>
+              </p:txBody>
+            </p:sp>
+            <p:sp>
+              <p:nvSpPr>
+                <p:cNvPr id="10" name="TextBox 9">
+                  <a:extLst>
+                    <a:ext uri="{FF2B5EF4-FFF2-40B4-BE49-F238E27FC236}">
+                      <a16:creationId xmlns:a16="http://schemas.microsoft.com/office/drawing/2014/main" id="{7BF01E10-1A06-4B5D-9456-2DF2A3FCA21B}"/>
+                    </a:ext>
+                  </a:extLst>
+                </p:cNvPr>
+                <p:cNvSpPr txBox="1"/>
+                <p:nvPr/>
+              </p:nvSpPr>
+              <p:spPr>
+                <a:xfrm>
+                  <a:off x="8684237" y="1986936"/>
+                  <a:ext cx="1048061" cy="923330"/>
+                </a:xfrm>
+                <a:prstGeom prst="rect">
+                  <a:avLst/>
+                </a:prstGeom>
+                <a:noFill/>
+                <a:ln>
+                  <a:solidFill>
+                    <a:schemeClr val="tx1"/>
+                  </a:solidFill>
+                </a:ln>
+              </p:spPr>
+              <p:txBody>
+                <a:bodyPr wrap="none" rtlCol="1">
+                  <a:spAutoFit/>
+                </a:bodyPr>
+                <a:lstStyle/>
+                <a:p>
+                  <a:r>
+                    <a:rPr lang="en-US" dirty="0"/>
+                    <a:t>Agent</a:t>
+                  </a:r>
+                </a:p>
+                <a:p>
+                  <a:r>
+                    <a:rPr lang="en-US" dirty="0"/>
+                    <a:t>Wrapper</a:t>
+                  </a:r>
+                </a:p>
+                <a:p>
+                  <a:endParaRPr lang="he-IL" dirty="0"/>
+                </a:p>
+              </p:txBody>
+            </p:sp>
+            <p:sp>
+              <p:nvSpPr>
+                <p:cNvPr id="11" name="Rectangle 10">
+                  <a:extLst>
+                    <a:ext uri="{FF2B5EF4-FFF2-40B4-BE49-F238E27FC236}">
+                      <a16:creationId xmlns:a16="http://schemas.microsoft.com/office/drawing/2014/main" id="{9DC35EB6-5774-4936-B170-CEE5DFBF27F4}"/>
+                    </a:ext>
+                  </a:extLst>
+                </p:cNvPr>
+                <p:cNvSpPr/>
+                <p:nvPr/>
+              </p:nvSpPr>
+              <p:spPr>
+                <a:xfrm>
+                  <a:off x="483262" y="1587935"/>
+                  <a:ext cx="5474037" cy="3160234"/>
+                </a:xfrm>
+                <a:prstGeom prst="rect">
+                  <a:avLst/>
+                </a:prstGeom>
+                <a:noFill/>
+              </p:spPr>
+              <p:style>
+                <a:lnRef idx="2">
+                  <a:schemeClr val="accent1">
+                    <a:shade val="50000"/>
+                  </a:schemeClr>
+                </a:lnRef>
+                <a:fillRef idx="1">
+                  <a:schemeClr val="accent1"/>
+                </a:fillRef>
+                <a:effectRef idx="0">
+                  <a:schemeClr val="accent1"/>
+                </a:effectRef>
+                <a:fontRef idx="minor">
+                  <a:schemeClr val="lt1"/>
+                </a:fontRef>
+              </p:style>
+              <p:txBody>
+                <a:bodyPr rtlCol="1" anchor="ctr"/>
+                <a:lstStyle/>
+                <a:p>
+                  <a:pPr algn="ctr"/>
+                  <a:endParaRPr lang="he-IL">
+                    <a:solidFill>
+                      <a:schemeClr val="tx1"/>
+                    </a:solidFill>
+                  </a:endParaRPr>
+                </a:p>
+              </p:txBody>
+            </p:sp>
+            <p:sp>
+              <p:nvSpPr>
+                <p:cNvPr id="12" name="Rectangle 11">
+                  <a:extLst>
+                    <a:ext uri="{FF2B5EF4-FFF2-40B4-BE49-F238E27FC236}">
+                      <a16:creationId xmlns:a16="http://schemas.microsoft.com/office/drawing/2014/main" id="{1BE3B8D8-FCFD-481C-8885-794E3E11CD44}"/>
+                    </a:ext>
+                  </a:extLst>
+                </p:cNvPr>
+                <p:cNvSpPr/>
+                <p:nvPr/>
+              </p:nvSpPr>
+              <p:spPr>
+                <a:xfrm>
+                  <a:off x="6168770" y="868484"/>
+                  <a:ext cx="5570742" cy="3160234"/>
+                </a:xfrm>
+                <a:prstGeom prst="rect">
+                  <a:avLst/>
+                </a:prstGeom>
+                <a:noFill/>
+              </p:spPr>
+              <p:style>
+                <a:lnRef idx="2">
+                  <a:schemeClr val="accent1">
+                    <a:shade val="50000"/>
+                  </a:schemeClr>
+                </a:lnRef>
+                <a:fillRef idx="1">
+                  <a:schemeClr val="accent1"/>
+                </a:fillRef>
+                <a:effectRef idx="0">
+                  <a:schemeClr val="accent1"/>
+                </a:effectRef>
+                <a:fontRef idx="minor">
+                  <a:schemeClr val="lt1"/>
+                </a:fontRef>
+              </p:style>
+              <p:txBody>
+                <a:bodyPr rtlCol="1" anchor="ctr"/>
+                <a:lstStyle/>
+                <a:p>
+                  <a:pPr algn="ctr"/>
+                  <a:endParaRPr lang="he-IL"/>
+                </a:p>
+              </p:txBody>
+            </p:sp>
+            <p:sp>
+              <p:nvSpPr>
+                <p:cNvPr id="13" name="TextBox 12">
+                  <a:extLst>
+                    <a:ext uri="{FF2B5EF4-FFF2-40B4-BE49-F238E27FC236}">
+                      <a16:creationId xmlns:a16="http://schemas.microsoft.com/office/drawing/2014/main" id="{8D21829E-60D5-4299-A170-506DA4B777E2}"/>
+                    </a:ext>
+                  </a:extLst>
+                </p:cNvPr>
+                <p:cNvSpPr txBox="1"/>
+                <p:nvPr/>
+              </p:nvSpPr>
+              <p:spPr>
+                <a:xfrm>
+                  <a:off x="8675848" y="943841"/>
+                  <a:ext cx="852413" cy="369332"/>
+                </a:xfrm>
+                <a:prstGeom prst="rect">
+                  <a:avLst/>
+                </a:prstGeom>
+                <a:noFill/>
+              </p:spPr>
+              <p:txBody>
+                <a:bodyPr wrap="none" rtlCol="1">
+                  <a:spAutoFit/>
+                </a:bodyPr>
+                <a:lstStyle/>
+                <a:p>
+                  <a:r>
+                    <a:rPr lang="en-US" dirty="0"/>
+                    <a:t>Python</a:t>
+                  </a:r>
+                  <a:endParaRPr lang="he-IL" dirty="0"/>
+                </a:p>
+              </p:txBody>
+            </p:sp>
+            <p:cxnSp>
+              <p:nvCxnSpPr>
+                <p:cNvPr id="19" name="Straight Arrow Connector 18">
+                  <a:extLst>
+                    <a:ext uri="{FF2B5EF4-FFF2-40B4-BE49-F238E27FC236}">
+                      <a16:creationId xmlns:a16="http://schemas.microsoft.com/office/drawing/2014/main" id="{BD6E6BB2-7A3F-4881-A18C-35D618006FFA}"/>
+                    </a:ext>
+                  </a:extLst>
+                </p:cNvPr>
+                <p:cNvCxnSpPr>
+                  <a:cxnSpLocks/>
+                  <a:stCxn id="8" idx="3"/>
+                  <a:endCxn id="7" idx="1"/>
+                </p:cNvCxnSpPr>
+                <p:nvPr/>
+              </p:nvCxnSpPr>
+              <p:spPr>
+                <a:xfrm flipV="1">
+                  <a:off x="5219975" y="2454466"/>
+                  <a:ext cx="1085871" cy="352361"/>
+                </a:xfrm>
+                <a:prstGeom prst="straightConnector1">
+                  <a:avLst/>
+                </a:prstGeom>
+                <a:ln w="76200">
+                  <a:headEnd type="triangle"/>
+                  <a:tailEnd type="triangle"/>
+                </a:ln>
+              </p:spPr>
+              <p:style>
+                <a:lnRef idx="1">
+                  <a:schemeClr val="accent1"/>
+                </a:lnRef>
+                <a:fillRef idx="0">
+                  <a:schemeClr val="accent1"/>
+                </a:fillRef>
+                <a:effectRef idx="0">
+                  <a:schemeClr val="accent1"/>
+                </a:effectRef>
+                <a:fontRef idx="minor">
+                  <a:schemeClr val="tx1"/>
+                </a:fontRef>
+              </p:style>
+            </p:cxnSp>
+            <p:cxnSp>
+              <p:nvCxnSpPr>
+                <p:cNvPr id="20" name="Straight Arrow Connector 19">
+                  <a:extLst>
+                    <a:ext uri="{FF2B5EF4-FFF2-40B4-BE49-F238E27FC236}">
+                      <a16:creationId xmlns:a16="http://schemas.microsoft.com/office/drawing/2014/main" id="{7778C3E0-DDFC-4537-AAAE-3F442CC9EFB0}"/>
+                    </a:ext>
+                  </a:extLst>
+                </p:cNvPr>
+                <p:cNvCxnSpPr>
+                  <a:cxnSpLocks/>
+                  <a:stCxn id="6" idx="3"/>
+                  <a:endCxn id="8" idx="1"/>
+                </p:cNvCxnSpPr>
+                <p:nvPr/>
+              </p:nvCxnSpPr>
+              <p:spPr>
+                <a:xfrm flipV="1">
+                  <a:off x="3110578" y="2806827"/>
+                  <a:ext cx="797756" cy="301315"/>
+                </a:xfrm>
+                <a:prstGeom prst="straightConnector1">
+                  <a:avLst/>
+                </a:prstGeom>
+                <a:ln w="76200">
+                  <a:headEnd type="triangle"/>
+                  <a:tailEnd type="triangle"/>
+                </a:ln>
+              </p:spPr>
+              <p:style>
+                <a:lnRef idx="1">
+                  <a:schemeClr val="accent1"/>
+                </a:lnRef>
+                <a:fillRef idx="0">
+                  <a:schemeClr val="accent1"/>
+                </a:fillRef>
+                <a:effectRef idx="0">
+                  <a:schemeClr val="accent1"/>
+                </a:effectRef>
+                <a:fontRef idx="minor">
+                  <a:schemeClr val="tx1"/>
+                </a:fontRef>
+              </p:style>
+            </p:cxnSp>
+            <p:cxnSp>
+              <p:nvCxnSpPr>
+                <p:cNvPr id="21" name="Straight Arrow Connector 20">
+                  <a:extLst>
+                    <a:ext uri="{FF2B5EF4-FFF2-40B4-BE49-F238E27FC236}">
+                      <a16:creationId xmlns:a16="http://schemas.microsoft.com/office/drawing/2014/main" id="{D19F4ABA-C3C2-4162-92AE-899DA9AEBCF1}"/>
+                    </a:ext>
+                  </a:extLst>
+                </p:cNvPr>
+                <p:cNvCxnSpPr>
+                  <a:cxnSpLocks/>
+                </p:cNvCxnSpPr>
+                <p:nvPr/>
+              </p:nvCxnSpPr>
+              <p:spPr>
+                <a:xfrm>
+                  <a:off x="7994942" y="2448601"/>
+                  <a:ext cx="680906" cy="0"/>
+                </a:xfrm>
+                <a:prstGeom prst="straightConnector1">
+                  <a:avLst/>
+                </a:prstGeom>
+                <a:ln w="76200">
+                  <a:headEnd type="triangle"/>
+                  <a:tailEnd type="triangle"/>
+                </a:ln>
+              </p:spPr>
+              <p:style>
+                <a:lnRef idx="1">
+                  <a:schemeClr val="accent1"/>
+                </a:lnRef>
+                <a:fillRef idx="0">
+                  <a:schemeClr val="accent1"/>
+                </a:fillRef>
+                <a:effectRef idx="0">
+                  <a:schemeClr val="accent1"/>
+                </a:effectRef>
+                <a:fontRef idx="minor">
+                  <a:schemeClr val="tx1"/>
+                </a:fontRef>
+              </p:style>
+            </p:cxnSp>
+            <p:cxnSp>
+              <p:nvCxnSpPr>
+                <p:cNvPr id="22" name="Straight Arrow Connector 21">
+                  <a:extLst>
+                    <a:ext uri="{FF2B5EF4-FFF2-40B4-BE49-F238E27FC236}">
+                      <a16:creationId xmlns:a16="http://schemas.microsoft.com/office/drawing/2014/main" id="{BA5718FE-001F-4E49-8AAA-7A9DAE837033}"/>
+                    </a:ext>
+                  </a:extLst>
+                </p:cNvPr>
+                <p:cNvCxnSpPr>
+                  <a:cxnSpLocks/>
+                  <a:stCxn id="6" idx="2"/>
+                  <a:endCxn id="9" idx="0"/>
+                </p:cNvCxnSpPr>
+                <p:nvPr/>
+              </p:nvCxnSpPr>
+              <p:spPr>
+                <a:xfrm flipH="1">
+                  <a:off x="1750009" y="3431307"/>
+                  <a:ext cx="513959" cy="524291"/>
+                </a:xfrm>
+                <a:prstGeom prst="straightConnector1">
+                  <a:avLst/>
+                </a:prstGeom>
+                <a:ln w="76200">
+                  <a:headEnd type="triangle"/>
+                  <a:tailEnd type="triangle"/>
+                </a:ln>
+              </p:spPr>
+              <p:style>
+                <a:lnRef idx="1">
+                  <a:schemeClr val="accent1"/>
+                </a:lnRef>
+                <a:fillRef idx="0">
+                  <a:schemeClr val="accent1"/>
+                </a:fillRef>
+                <a:effectRef idx="0">
+                  <a:schemeClr val="accent1"/>
+                </a:effectRef>
+                <a:fontRef idx="minor">
+                  <a:schemeClr val="tx1"/>
+                </a:fontRef>
+              </p:style>
+            </p:cxnSp>
+          </p:grpSp>
           <p:sp>
             <p:nvSpPr>
-              <p:cNvPr id="5" name="TextBox 4">
+              <p:cNvPr id="24" name="TextBox 23">
                 <a:extLst>
                   <a:ext uri="{FF2B5EF4-FFF2-40B4-BE49-F238E27FC236}">
-                    <a16:creationId xmlns:a16="http://schemas.microsoft.com/office/drawing/2014/main" id="{E368FD6D-2DA4-4EB3-BB5F-2B347845FF5B}"/>
+                    <a16:creationId xmlns:a16="http://schemas.microsoft.com/office/drawing/2014/main" id="{307E9038-3CF8-4ABE-BA58-71D5A700FEC4}"/>
                   </a:ext>
                 </a:extLst>
               </p:cNvPr>
@@ -3401,49 +4017,8 @@
             </p:nvSpPr>
             <p:spPr>
               <a:xfrm>
-                <a:off x="2159898" y="1802270"/>
-                <a:ext cx="1212191" cy="646331"/>
-              </a:xfrm>
-              <a:prstGeom prst="rect">
-                <a:avLst/>
-              </a:prstGeom>
-              <a:noFill/>
-              <a:ln>
-                <a:noFill/>
-              </a:ln>
-            </p:spPr>
-            <p:txBody>
-              <a:bodyPr wrap="none" rtlCol="1">
-                <a:spAutoFit/>
-              </a:bodyPr>
-              <a:lstStyle/>
-              <a:p>
-                <a:r>
-                  <a:rPr lang="en-US" dirty="0"/>
-                  <a:t>Unity build</a:t>
-                </a:r>
-              </a:p>
-              <a:p>
-                <a:endParaRPr lang="he-IL" dirty="0"/>
-              </a:p>
-            </p:txBody>
-          </p:sp>
-          <p:sp>
-            <p:nvSpPr>
-              <p:cNvPr id="6" name="TextBox 5">
-                <a:extLst>
-                  <a:ext uri="{FF2B5EF4-FFF2-40B4-BE49-F238E27FC236}">
-                    <a16:creationId xmlns:a16="http://schemas.microsoft.com/office/drawing/2014/main" id="{334A3AD7-4E40-49BC-A429-C14BB2EEFD41}"/>
-                  </a:ext>
-                </a:extLst>
-              </p:cNvPr>
-              <p:cNvSpPr txBox="1"/>
-              <p:nvPr/>
-            </p:nvSpPr>
-            <p:spPr>
-              <a:xfrm>
-                <a:off x="1417358" y="2784976"/>
-                <a:ext cx="1693220" cy="646331"/>
+                <a:off x="3057041" y="3969773"/>
+                <a:ext cx="2849413" cy="646331"/>
               </a:xfrm>
               <a:prstGeom prst="rect">
                 <a:avLst/>
@@ -3463,210 +4038,772 @@
               <a:p>
                 <a:r>
                   <a:rPr lang="en-US" dirty="0"/>
-                  <a:t>ml-agent toolkit</a:t>
-                </a:r>
-              </a:p>
-              <a:p>
-                <a:endParaRPr lang="he-IL" dirty="0"/>
-              </a:p>
-            </p:txBody>
-          </p:sp>
-          <p:sp>
-            <p:nvSpPr>
-              <p:cNvPr id="7" name="TextBox 6">
-                <a:extLst>
-                  <a:ext uri="{FF2B5EF4-FFF2-40B4-BE49-F238E27FC236}">
-                    <a16:creationId xmlns:a16="http://schemas.microsoft.com/office/drawing/2014/main" id="{00B5900F-99C7-406A-B711-AEE0E822B8EF}"/>
-                  </a:ext>
-                </a:extLst>
-              </p:cNvPr>
-              <p:cNvSpPr txBox="1"/>
-              <p:nvPr/>
-            </p:nvSpPr>
-            <p:spPr>
-              <a:xfrm>
-                <a:off x="7053741" y="1760585"/>
-                <a:ext cx="1695657" cy="923330"/>
-              </a:xfrm>
-              <a:prstGeom prst="rect">
-                <a:avLst/>
-              </a:prstGeom>
-              <a:noFill/>
-              <a:ln>
-                <a:solidFill>
-                  <a:schemeClr val="tx1"/>
-                </a:solidFill>
-              </a:ln>
-            </p:spPr>
-            <p:txBody>
-              <a:bodyPr wrap="none" rtlCol="1">
-                <a:spAutoFit/>
-              </a:bodyPr>
-              <a:lstStyle/>
-              <a:p>
-                <a:r>
-                  <a:rPr lang="en-US" dirty="0"/>
-                  <a:t>Python wrapper</a:t>
+                  <a:t>Game Logic</a:t>
                 </a:r>
               </a:p>
               <a:p>
                 <a:r>
                   <a:rPr lang="en-US" dirty="0"/>
-                  <a:t>Test/train</a:t>
+                  <a:t>(observations and rewards)</a:t>
                 </a:r>
-              </a:p>
-              <a:p>
-                <a:endParaRPr lang="he-IL" dirty="0"/>
               </a:p>
             </p:txBody>
           </p:sp>
-          <p:sp>
-            <p:nvSpPr>
-              <p:cNvPr id="8" name="TextBox 7">
+          <p:cxnSp>
+            <p:nvCxnSpPr>
+              <p:cNvPr id="25" name="Straight Arrow Connector 24">
                 <a:extLst>
                   <a:ext uri="{FF2B5EF4-FFF2-40B4-BE49-F238E27FC236}">
-                    <a16:creationId xmlns:a16="http://schemas.microsoft.com/office/drawing/2014/main" id="{2059467D-BB16-4E0E-A4D9-E1BD12557115}"/>
+                    <a16:creationId xmlns:a16="http://schemas.microsoft.com/office/drawing/2014/main" id="{DCE64A49-5D61-47A7-A4FD-BC2846FB3BDE}"/>
                   </a:ext>
                 </a:extLst>
               </p:cNvPr>
-              <p:cNvSpPr txBox="1"/>
+              <p:cNvCxnSpPr>
+                <a:cxnSpLocks/>
+                <a:stCxn id="6" idx="2"/>
+                <a:endCxn id="24" idx="0"/>
+              </p:cNvCxnSpPr>
               <p:nvPr/>
-            </p:nvSpPr>
+            </p:nvCxnSpPr>
             <p:spPr>
               <a:xfrm>
-                <a:off x="3908334" y="2345162"/>
-                <a:ext cx="1311641" cy="923330"/>
+                <a:off x="2263968" y="3431307"/>
+                <a:ext cx="2217779" cy="538466"/>
               </a:xfrm>
-              <a:prstGeom prst="rect">
+              <a:prstGeom prst="straightConnector1">
                 <a:avLst/>
               </a:prstGeom>
+              <a:ln w="76200">
+                <a:headEnd type="triangle"/>
+                <a:tailEnd type="triangle"/>
+              </a:ln>
+            </p:spPr>
+            <p:style>
+              <a:lnRef idx="1">
+                <a:schemeClr val="accent1"/>
+              </a:lnRef>
+              <a:fillRef idx="0">
+                <a:schemeClr val="accent1"/>
+              </a:fillRef>
+              <a:effectRef idx="0">
+                <a:schemeClr val="accent1"/>
+              </a:effectRef>
+              <a:fontRef idx="minor">
+                <a:schemeClr val="tx1"/>
+              </a:fontRef>
+            </p:style>
+          </p:cxnSp>
+        </p:grpSp>
+        <p:sp>
+          <p:nvSpPr>
+            <p:cNvPr id="23" name="TextBox 22">
+              <a:extLst>
+                <a:ext uri="{FF2B5EF4-FFF2-40B4-BE49-F238E27FC236}">
+                  <a16:creationId xmlns:a16="http://schemas.microsoft.com/office/drawing/2014/main" id="{C4B019FA-7C8E-46CF-A06C-BDFC5C4A8E07}"/>
+                </a:ext>
+              </a:extLst>
+            </p:cNvPr>
+            <p:cNvSpPr txBox="1"/>
+            <p:nvPr/>
+          </p:nvSpPr>
+          <p:spPr>
+            <a:xfrm>
+              <a:off x="9545140" y="1851796"/>
+              <a:ext cx="734496" cy="369332"/>
+            </a:xfrm>
+            <a:prstGeom prst="rect">
+              <a:avLst/>
+            </a:prstGeom>
+            <a:noFill/>
+            <a:ln>
+              <a:solidFill>
+                <a:schemeClr val="tx1"/>
+              </a:solidFill>
+            </a:ln>
+          </p:spPr>
+          <p:txBody>
+            <a:bodyPr wrap="none" rtlCol="1">
+              <a:spAutoFit/>
+            </a:bodyPr>
+            <a:lstStyle/>
+            <a:p>
+              <a:r>
+                <a:rPr lang="en-US" dirty="0"/>
+                <a:t>DDPG</a:t>
+              </a:r>
+            </a:p>
+          </p:txBody>
+        </p:sp>
+        <p:sp>
+          <p:nvSpPr>
+            <p:cNvPr id="26" name="TextBox 25">
+              <a:extLst>
+                <a:ext uri="{FF2B5EF4-FFF2-40B4-BE49-F238E27FC236}">
+                  <a16:creationId xmlns:a16="http://schemas.microsoft.com/office/drawing/2014/main" id="{394CDD2D-B2BA-4B65-851C-0B4135F04956}"/>
+                </a:ext>
+              </a:extLst>
+            </p:cNvPr>
+            <p:cNvSpPr txBox="1"/>
+            <p:nvPr/>
+          </p:nvSpPr>
+          <p:spPr>
+            <a:xfrm>
+              <a:off x="9551480" y="2440855"/>
+              <a:ext cx="931665" cy="369332"/>
+            </a:xfrm>
+            <a:prstGeom prst="rect">
+              <a:avLst/>
+            </a:prstGeom>
+            <a:noFill/>
+            <a:ln>
+              <a:solidFill>
+                <a:schemeClr val="tx1"/>
+              </a:solidFill>
+            </a:ln>
+          </p:spPr>
+          <p:txBody>
+            <a:bodyPr wrap="none" rtlCol="1">
+              <a:spAutoFit/>
+            </a:bodyPr>
+            <a:lstStyle/>
+            <a:p>
+              <a:r>
+                <a:rPr lang="en-US" dirty="0"/>
+                <a:t>MDDPG</a:t>
+              </a:r>
+            </a:p>
+          </p:txBody>
+        </p:sp>
+        <p:sp>
+          <p:nvSpPr>
+            <p:cNvPr id="27" name="TextBox 26">
+              <a:extLst>
+                <a:ext uri="{FF2B5EF4-FFF2-40B4-BE49-F238E27FC236}">
+                  <a16:creationId xmlns:a16="http://schemas.microsoft.com/office/drawing/2014/main" id="{3E5F6D51-A361-46C2-A158-58B6F214467D}"/>
+                </a:ext>
+              </a:extLst>
+            </p:cNvPr>
+            <p:cNvSpPr txBox="1"/>
+            <p:nvPr/>
+          </p:nvSpPr>
+          <p:spPr>
+            <a:xfrm>
+              <a:off x="9551480" y="3079079"/>
+              <a:ext cx="1064715" cy="369332"/>
+            </a:xfrm>
+            <a:prstGeom prst="rect">
+              <a:avLst/>
+            </a:prstGeom>
+            <a:noFill/>
+            <a:ln>
+              <a:solidFill>
+                <a:schemeClr val="tx1"/>
+              </a:solidFill>
+            </a:ln>
+          </p:spPr>
+          <p:txBody>
+            <a:bodyPr wrap="none" rtlCol="1">
+              <a:spAutoFit/>
+            </a:bodyPr>
+            <a:lstStyle/>
+            <a:p>
+              <a:r>
+                <a:rPr lang="en-US" dirty="0"/>
+                <a:t>MADDPG</a:t>
+              </a:r>
+            </a:p>
+          </p:txBody>
+        </p:sp>
+        <p:cxnSp>
+          <p:nvCxnSpPr>
+            <p:cNvPr id="28" name="Straight Arrow Connector 27">
+              <a:extLst>
+                <a:ext uri="{FF2B5EF4-FFF2-40B4-BE49-F238E27FC236}">
+                  <a16:creationId xmlns:a16="http://schemas.microsoft.com/office/drawing/2014/main" id="{483D9FF8-658E-4D9F-8F31-54856CBC6122}"/>
+                </a:ext>
+              </a:extLst>
+            </p:cNvPr>
+            <p:cNvCxnSpPr>
+              <a:cxnSpLocks/>
+              <a:stCxn id="10" idx="3"/>
+              <a:endCxn id="27" idx="1"/>
+            </p:cNvCxnSpPr>
+            <p:nvPr/>
+          </p:nvCxnSpPr>
+          <p:spPr>
+            <a:xfrm>
+              <a:off x="9020370" y="2544294"/>
+              <a:ext cx="531110" cy="719451"/>
+            </a:xfrm>
+            <a:prstGeom prst="straightConnector1">
+              <a:avLst/>
+            </a:prstGeom>
+            <a:ln w="76200">
+              <a:headEnd type="triangle"/>
+              <a:tailEnd type="triangle"/>
+            </a:ln>
+          </p:spPr>
+          <p:style>
+            <a:lnRef idx="1">
+              <a:schemeClr val="accent1"/>
+            </a:lnRef>
+            <a:fillRef idx="0">
+              <a:schemeClr val="accent1"/>
+            </a:fillRef>
+            <a:effectRef idx="0">
+              <a:schemeClr val="accent1"/>
+            </a:effectRef>
+            <a:fontRef idx="minor">
+              <a:schemeClr val="tx1"/>
+            </a:fontRef>
+          </p:style>
+        </p:cxnSp>
+        <p:cxnSp>
+          <p:nvCxnSpPr>
+            <p:cNvPr id="29" name="Straight Arrow Connector 28">
+              <a:extLst>
+                <a:ext uri="{FF2B5EF4-FFF2-40B4-BE49-F238E27FC236}">
+                  <a16:creationId xmlns:a16="http://schemas.microsoft.com/office/drawing/2014/main" id="{54EFDE4D-5D17-4CA4-A205-87B01A6416A7}"/>
+                </a:ext>
+              </a:extLst>
+            </p:cNvPr>
+            <p:cNvCxnSpPr>
+              <a:cxnSpLocks/>
+              <a:stCxn id="10" idx="3"/>
+              <a:endCxn id="26" idx="1"/>
+            </p:cNvCxnSpPr>
+            <p:nvPr/>
+          </p:nvCxnSpPr>
+          <p:spPr>
+            <a:xfrm>
+              <a:off x="9020370" y="2544294"/>
+              <a:ext cx="531110" cy="81227"/>
+            </a:xfrm>
+            <a:prstGeom prst="straightConnector1">
+              <a:avLst/>
+            </a:prstGeom>
+            <a:ln w="76200">
+              <a:headEnd type="triangle"/>
+              <a:tailEnd type="triangle"/>
+            </a:ln>
+          </p:spPr>
+          <p:style>
+            <a:lnRef idx="1">
+              <a:schemeClr val="accent1"/>
+            </a:lnRef>
+            <a:fillRef idx="0">
+              <a:schemeClr val="accent1"/>
+            </a:fillRef>
+            <a:effectRef idx="0">
+              <a:schemeClr val="accent1"/>
+            </a:effectRef>
+            <a:fontRef idx="minor">
+              <a:schemeClr val="tx1"/>
+            </a:fontRef>
+          </p:style>
+        </p:cxnSp>
+        <p:cxnSp>
+          <p:nvCxnSpPr>
+            <p:cNvPr id="30" name="Straight Arrow Connector 29">
+              <a:extLst>
+                <a:ext uri="{FF2B5EF4-FFF2-40B4-BE49-F238E27FC236}">
+                  <a16:creationId xmlns:a16="http://schemas.microsoft.com/office/drawing/2014/main" id="{34CA6D89-B438-4CA6-847F-1D4FFA918268}"/>
+                </a:ext>
+              </a:extLst>
+            </p:cNvPr>
+            <p:cNvCxnSpPr>
+              <a:cxnSpLocks/>
+              <a:stCxn id="10" idx="3"/>
+              <a:endCxn id="23" idx="1"/>
+            </p:cNvCxnSpPr>
+            <p:nvPr/>
+          </p:nvCxnSpPr>
+          <p:spPr>
+            <a:xfrm flipV="1">
+              <a:off x="9020370" y="2036462"/>
+              <a:ext cx="524770" cy="507832"/>
+            </a:xfrm>
+            <a:prstGeom prst="straightConnector1">
+              <a:avLst/>
+            </a:prstGeom>
+            <a:ln w="76200">
+              <a:headEnd type="triangle"/>
+              <a:tailEnd type="triangle"/>
+            </a:ln>
+          </p:spPr>
+          <p:style>
+            <a:lnRef idx="1">
+              <a:schemeClr val="accent1"/>
+            </a:lnRef>
+            <a:fillRef idx="0">
+              <a:schemeClr val="accent1"/>
+            </a:fillRef>
+            <a:effectRef idx="0">
+              <a:schemeClr val="accent1"/>
+            </a:effectRef>
+            <a:fontRef idx="minor">
+              <a:schemeClr val="tx1"/>
+            </a:fontRef>
+          </p:style>
+        </p:cxnSp>
+      </p:grpSp>
+    </p:spTree>
+    <p:extLst>
+      <p:ext uri="{BB962C8B-B14F-4D97-AF65-F5344CB8AC3E}">
+        <p14:creationId xmlns:p14="http://schemas.microsoft.com/office/powerpoint/2010/main" val="1626896277"/>
+      </p:ext>
+    </p:extLst>
+  </p:cSld>
+  <p:clrMapOvr>
+    <a:masterClrMapping/>
+  </p:clrMapOvr>
+</p:sld>
+</file>
+
+<file path=ppt/slides/slide2.xml><?xml version="1.0" encoding="utf-8"?>
+<p:sld xmlns:a="http://schemas.openxmlformats.org/drawingml/2006/main" xmlns:r="http://schemas.openxmlformats.org/officeDocument/2006/relationships" xmlns:p="http://schemas.openxmlformats.org/presentationml/2006/main">
+  <p:cSld>
+    <p:spTree>
+      <p:nvGrpSpPr>
+        <p:cNvPr id="1" name=""/>
+        <p:cNvGrpSpPr/>
+        <p:nvPr/>
+      </p:nvGrpSpPr>
+      <p:grpSpPr>
+        <a:xfrm>
+          <a:off x="0" y="0"/>
+          <a:ext cx="0" cy="0"/>
+          <a:chOff x="0" y="0"/>
+          <a:chExt cx="0" cy="0"/>
+        </a:xfrm>
+      </p:grpSpPr>
+      <p:grpSp>
+        <p:nvGrpSpPr>
+          <p:cNvPr id="161" name="Group 160">
+            <a:extLst>
+              <a:ext uri="{FF2B5EF4-FFF2-40B4-BE49-F238E27FC236}">
+                <a16:creationId xmlns:a16="http://schemas.microsoft.com/office/drawing/2014/main" id="{94115505-AEF6-4D93-AA78-5E2097455FF9}"/>
+              </a:ext>
+            </a:extLst>
+          </p:cNvPr>
+          <p:cNvGrpSpPr/>
+          <p:nvPr/>
+        </p:nvGrpSpPr>
+        <p:grpSpPr>
+          <a:xfrm>
+            <a:off x="331785" y="337929"/>
+            <a:ext cx="11754707" cy="6226996"/>
+            <a:chOff x="343508" y="631004"/>
+            <a:chExt cx="11754707" cy="6226996"/>
+          </a:xfrm>
+        </p:grpSpPr>
+        <p:sp>
+          <p:nvSpPr>
+            <p:cNvPr id="15" name="TextBox 14">
+              <a:extLst>
+                <a:ext uri="{FF2B5EF4-FFF2-40B4-BE49-F238E27FC236}">
+                  <a16:creationId xmlns:a16="http://schemas.microsoft.com/office/drawing/2014/main" id="{9831956B-EAF5-45C8-8C44-595689D67020}"/>
+                </a:ext>
+              </a:extLst>
+            </p:cNvPr>
+            <p:cNvSpPr txBox="1"/>
+            <p:nvPr/>
+          </p:nvSpPr>
+          <p:spPr>
+            <a:xfrm>
+              <a:off x="7719694" y="648363"/>
+              <a:ext cx="1792478" cy="646331"/>
+            </a:xfrm>
+            <a:prstGeom prst="rect">
+              <a:avLst/>
+            </a:prstGeom>
+            <a:noFill/>
+            <a:ln>
               <a:noFill/>
-              <a:ln>
+            </a:ln>
+          </p:spPr>
+          <p:txBody>
+            <a:bodyPr wrap="none" rtlCol="1">
+              <a:spAutoFit/>
+            </a:bodyPr>
+            <a:lstStyle/>
+            <a:p>
+              <a:r>
+                <a:rPr lang="en-US" b="1" dirty="0"/>
+                <a:t>Race Game Logic</a:t>
+              </a:r>
+            </a:p>
+            <a:p>
+              <a:endParaRPr lang="he-IL" b="1" dirty="0"/>
+            </a:p>
+          </p:txBody>
+        </p:sp>
+        <p:sp>
+          <p:nvSpPr>
+            <p:cNvPr id="16" name="TextBox 15">
+              <a:extLst>
+                <a:ext uri="{FF2B5EF4-FFF2-40B4-BE49-F238E27FC236}">
+                  <a16:creationId xmlns:a16="http://schemas.microsoft.com/office/drawing/2014/main" id="{CC4068E6-63B9-417C-B85E-AD5872E5CBCC}"/>
+                </a:ext>
+              </a:extLst>
+            </p:cNvPr>
+            <p:cNvSpPr txBox="1"/>
+            <p:nvPr/>
+          </p:nvSpPr>
+          <p:spPr>
+            <a:xfrm>
+              <a:off x="1099210" y="1274713"/>
+              <a:ext cx="670440" cy="369332"/>
+            </a:xfrm>
+            <a:prstGeom prst="rect">
+              <a:avLst/>
+            </a:prstGeom>
+            <a:noFill/>
+            <a:ln>
+              <a:solidFill>
+                <a:schemeClr val="tx1"/>
+              </a:solidFill>
+            </a:ln>
+          </p:spPr>
+          <p:txBody>
+            <a:bodyPr wrap="none" rtlCol="1">
+              <a:spAutoFit/>
+            </a:bodyPr>
+            <a:lstStyle/>
+            <a:p>
+              <a:r>
+                <a:rPr lang="en-US" dirty="0"/>
+                <a:t>Brain</a:t>
+              </a:r>
+            </a:p>
+          </p:txBody>
+        </p:sp>
+        <p:sp>
+          <p:nvSpPr>
+            <p:cNvPr id="18" name="TextBox 17">
+              <a:extLst>
+                <a:ext uri="{FF2B5EF4-FFF2-40B4-BE49-F238E27FC236}">
+                  <a16:creationId xmlns:a16="http://schemas.microsoft.com/office/drawing/2014/main" id="{B1F46437-26FC-4906-8E96-BEB9E4F67CE0}"/>
+                </a:ext>
+              </a:extLst>
+            </p:cNvPr>
+            <p:cNvSpPr txBox="1"/>
+            <p:nvPr/>
+          </p:nvSpPr>
+          <p:spPr>
+            <a:xfrm>
+              <a:off x="4756788" y="2018551"/>
+              <a:ext cx="1547411" cy="369332"/>
+            </a:xfrm>
+            <a:prstGeom prst="rect">
+              <a:avLst/>
+            </a:prstGeom>
+            <a:noFill/>
+            <a:ln>
+              <a:solidFill>
+                <a:schemeClr val="tx1"/>
+              </a:solidFill>
+            </a:ln>
+          </p:spPr>
+          <p:txBody>
+            <a:bodyPr wrap="none" rtlCol="1">
+              <a:spAutoFit/>
+            </a:bodyPr>
+            <a:lstStyle/>
+            <a:p>
+              <a:r>
+                <a:rPr lang="en-US" dirty="0"/>
+                <a:t>Race Academy</a:t>
+              </a:r>
+            </a:p>
+          </p:txBody>
+        </p:sp>
+        <p:sp>
+          <p:nvSpPr>
+            <p:cNvPr id="21" name="Rectangle 20">
+              <a:extLst>
+                <a:ext uri="{FF2B5EF4-FFF2-40B4-BE49-F238E27FC236}">
+                  <a16:creationId xmlns:a16="http://schemas.microsoft.com/office/drawing/2014/main" id="{DEBDE303-C5FE-4F98-AF25-60EFBD498F9E}"/>
+                </a:ext>
+              </a:extLst>
+            </p:cNvPr>
+            <p:cNvSpPr/>
+            <p:nvPr/>
+          </p:nvSpPr>
+          <p:spPr>
+            <a:xfrm>
+              <a:off x="4540106" y="631004"/>
+              <a:ext cx="7558109" cy="6226996"/>
+            </a:xfrm>
+            <a:prstGeom prst="rect">
+              <a:avLst/>
+            </a:prstGeom>
+            <a:noFill/>
+          </p:spPr>
+          <p:style>
+            <a:lnRef idx="2">
+              <a:schemeClr val="accent1">
+                <a:shade val="50000"/>
+              </a:schemeClr>
+            </a:lnRef>
+            <a:fillRef idx="1">
+              <a:schemeClr val="accent1"/>
+            </a:fillRef>
+            <a:effectRef idx="0">
+              <a:schemeClr val="accent1"/>
+            </a:effectRef>
+            <a:fontRef idx="minor">
+              <a:schemeClr val="lt1"/>
+            </a:fontRef>
+          </p:style>
+          <p:txBody>
+            <a:bodyPr rtlCol="1" anchor="ctr"/>
+            <a:lstStyle/>
+            <a:p>
+              <a:pPr algn="ctr"/>
+              <a:endParaRPr lang="he-IL">
                 <a:solidFill>
                   <a:schemeClr val="tx1"/>
                 </a:solidFill>
-              </a:ln>
-            </p:spPr>
-            <p:txBody>
-              <a:bodyPr wrap="none" rtlCol="1">
-                <a:spAutoFit/>
-              </a:bodyPr>
-              <a:lstStyle/>
-              <a:p>
-                <a:r>
-                  <a:rPr lang="en-US" dirty="0"/>
-                  <a:t>ML-agent </a:t>
-                </a:r>
-              </a:p>
-              <a:p>
-                <a:r>
-                  <a:rPr lang="en-US" dirty="0"/>
-                  <a:t>Brain object</a:t>
-                </a:r>
-              </a:p>
-              <a:p>
-                <a:endParaRPr lang="he-IL" dirty="0"/>
-              </a:p>
-            </p:txBody>
-          </p:sp>
-          <p:sp>
-            <p:nvSpPr>
-              <p:cNvPr id="9" name="TextBox 8">
-                <a:extLst>
-                  <a:ext uri="{FF2B5EF4-FFF2-40B4-BE49-F238E27FC236}">
-                    <a16:creationId xmlns:a16="http://schemas.microsoft.com/office/drawing/2014/main" id="{4D51F39D-E2BE-4F52-A9C6-FCA98CC87FE9}"/>
-                  </a:ext>
-                </a:extLst>
-              </p:cNvPr>
-              <p:cNvSpPr txBox="1"/>
-              <p:nvPr/>
-            </p:nvSpPr>
-            <p:spPr>
-              <a:xfrm>
-                <a:off x="671797" y="3955598"/>
-                <a:ext cx="2156424" cy="646331"/>
-              </a:xfrm>
-              <a:prstGeom prst="rect">
-                <a:avLst/>
-              </a:prstGeom>
-              <a:noFill/>
-              <a:ln>
+              </a:endParaRPr>
+            </a:p>
+          </p:txBody>
+        </p:sp>
+        <p:sp>
+          <p:nvSpPr>
+            <p:cNvPr id="13" name="TextBox 12">
+              <a:extLst>
+                <a:ext uri="{FF2B5EF4-FFF2-40B4-BE49-F238E27FC236}">
+                  <a16:creationId xmlns:a16="http://schemas.microsoft.com/office/drawing/2014/main" id="{D2A0F00F-196F-4E20-B1D3-2A623E6499DE}"/>
+                </a:ext>
+              </a:extLst>
+            </p:cNvPr>
+            <p:cNvSpPr txBox="1"/>
+            <p:nvPr/>
+          </p:nvSpPr>
+          <p:spPr>
+            <a:xfrm>
+              <a:off x="7641130" y="5864531"/>
+              <a:ext cx="2226059" cy="369332"/>
+            </a:xfrm>
+            <a:prstGeom prst="rect">
+              <a:avLst/>
+            </a:prstGeom>
+            <a:noFill/>
+            <a:ln>
+              <a:solidFill>
+                <a:schemeClr val="tx1"/>
+              </a:solidFill>
+            </a:ln>
+          </p:spPr>
+          <p:txBody>
+            <a:bodyPr wrap="none" rtlCol="1">
+              <a:spAutoFit/>
+            </a:bodyPr>
+            <a:lstStyle/>
+            <a:p>
+              <a:r>
+                <a:rPr lang="en-US" dirty="0"/>
+                <a:t>Checkpoints Manager</a:t>
+              </a:r>
+            </a:p>
+          </p:txBody>
+        </p:sp>
+        <p:sp>
+          <p:nvSpPr>
+            <p:cNvPr id="35" name="Rectangle 34">
+              <a:extLst>
+                <a:ext uri="{FF2B5EF4-FFF2-40B4-BE49-F238E27FC236}">
+                  <a16:creationId xmlns:a16="http://schemas.microsoft.com/office/drawing/2014/main" id="{C82B2733-6E9C-450A-9573-7025FD92F814}"/>
+                </a:ext>
+              </a:extLst>
+            </p:cNvPr>
+            <p:cNvSpPr/>
+            <p:nvPr/>
+          </p:nvSpPr>
+          <p:spPr>
+            <a:xfrm>
+              <a:off x="343508" y="657790"/>
+              <a:ext cx="2281309" cy="2490726"/>
+            </a:xfrm>
+            <a:prstGeom prst="rect">
+              <a:avLst/>
+            </a:prstGeom>
+            <a:noFill/>
+          </p:spPr>
+          <p:style>
+            <a:lnRef idx="2">
+              <a:schemeClr val="accent1">
+                <a:shade val="50000"/>
+              </a:schemeClr>
+            </a:lnRef>
+            <a:fillRef idx="1">
+              <a:schemeClr val="accent1"/>
+            </a:fillRef>
+            <a:effectRef idx="0">
+              <a:schemeClr val="accent1"/>
+            </a:effectRef>
+            <a:fontRef idx="minor">
+              <a:schemeClr val="lt1"/>
+            </a:fontRef>
+          </p:style>
+          <p:txBody>
+            <a:bodyPr rtlCol="1" anchor="ctr"/>
+            <a:lstStyle/>
+            <a:p>
+              <a:pPr algn="ctr"/>
+              <a:endParaRPr lang="he-IL">
                 <a:solidFill>
                   <a:schemeClr val="tx1"/>
                 </a:solidFill>
-              </a:ln>
-            </p:spPr>
-            <p:txBody>
-              <a:bodyPr wrap="none" rtlCol="1">
-                <a:spAutoFit/>
-              </a:bodyPr>
-              <a:lstStyle/>
-              <a:p>
-                <a:r>
-                  <a:rPr lang="en-US" dirty="0"/>
-                  <a:t>Unity Graphic engine</a:t>
-                </a:r>
-              </a:p>
-              <a:p>
-                <a:endParaRPr lang="he-IL" dirty="0"/>
-              </a:p>
-            </p:txBody>
-          </p:sp>
+              </a:endParaRPr>
+            </a:p>
+          </p:txBody>
+        </p:sp>
+        <p:sp>
+          <p:nvSpPr>
+            <p:cNvPr id="36" name="TextBox 35">
+              <a:extLst>
+                <a:ext uri="{FF2B5EF4-FFF2-40B4-BE49-F238E27FC236}">
+                  <a16:creationId xmlns:a16="http://schemas.microsoft.com/office/drawing/2014/main" id="{C88FCE1B-5E0B-4983-A121-5B440F7C1A2F}"/>
+                </a:ext>
+              </a:extLst>
+            </p:cNvPr>
+            <p:cNvSpPr txBox="1"/>
+            <p:nvPr/>
+          </p:nvSpPr>
+          <p:spPr>
+            <a:xfrm>
+              <a:off x="384332" y="667854"/>
+              <a:ext cx="2273571" cy="369332"/>
+            </a:xfrm>
+            <a:prstGeom prst="rect">
+              <a:avLst/>
+            </a:prstGeom>
+            <a:noFill/>
+            <a:ln>
+              <a:noFill/>
+            </a:ln>
+          </p:spPr>
+          <p:txBody>
+            <a:bodyPr wrap="none" rtlCol="1">
+              <a:spAutoFit/>
+            </a:bodyPr>
+            <a:lstStyle/>
+            <a:p>
+              <a:r>
+                <a:rPr lang="en-US" b="1" dirty="0"/>
+                <a:t>ml-agent Base Classes</a:t>
+              </a:r>
+            </a:p>
+          </p:txBody>
+        </p:sp>
+        <p:sp>
+          <p:nvSpPr>
+            <p:cNvPr id="37" name="TextBox 36">
+              <a:extLst>
+                <a:ext uri="{FF2B5EF4-FFF2-40B4-BE49-F238E27FC236}">
+                  <a16:creationId xmlns:a16="http://schemas.microsoft.com/office/drawing/2014/main" id="{5F9FB95A-ACFF-49A8-9C76-727C777587AB}"/>
+                </a:ext>
+              </a:extLst>
+            </p:cNvPr>
+            <p:cNvSpPr txBox="1"/>
+            <p:nvPr/>
+          </p:nvSpPr>
+          <p:spPr>
+            <a:xfrm>
+              <a:off x="1042364" y="2016598"/>
+              <a:ext cx="1045671" cy="369332"/>
+            </a:xfrm>
+            <a:prstGeom prst="rect">
+              <a:avLst/>
+            </a:prstGeom>
+            <a:noFill/>
+            <a:ln>
+              <a:solidFill>
+                <a:schemeClr val="tx1"/>
+              </a:solidFill>
+            </a:ln>
+          </p:spPr>
+          <p:txBody>
+            <a:bodyPr wrap="none" rtlCol="1">
+              <a:spAutoFit/>
+            </a:bodyPr>
+            <a:lstStyle/>
+            <a:p>
+              <a:r>
+                <a:rPr lang="en-US" dirty="0"/>
+                <a:t>Academy</a:t>
+              </a:r>
+            </a:p>
+          </p:txBody>
+        </p:sp>
+        <p:sp>
+          <p:nvSpPr>
+            <p:cNvPr id="38" name="TextBox 37">
+              <a:extLst>
+                <a:ext uri="{FF2B5EF4-FFF2-40B4-BE49-F238E27FC236}">
+                  <a16:creationId xmlns:a16="http://schemas.microsoft.com/office/drawing/2014/main" id="{DA900649-AD8D-439B-842C-E22ECC4E6DB5}"/>
+                </a:ext>
+              </a:extLst>
+            </p:cNvPr>
+            <p:cNvSpPr txBox="1"/>
+            <p:nvPr/>
+          </p:nvSpPr>
+          <p:spPr>
+            <a:xfrm>
+              <a:off x="1115728" y="2662929"/>
+              <a:ext cx="736868" cy="369332"/>
+            </a:xfrm>
+            <a:prstGeom prst="rect">
+              <a:avLst/>
+            </a:prstGeom>
+            <a:noFill/>
+            <a:ln>
+              <a:solidFill>
+                <a:schemeClr val="tx1"/>
+              </a:solidFill>
+            </a:ln>
+          </p:spPr>
+          <p:txBody>
+            <a:bodyPr wrap="none" rtlCol="1">
+              <a:spAutoFit/>
+            </a:bodyPr>
+            <a:lstStyle/>
+            <a:p>
+              <a:r>
+                <a:rPr lang="en-US" dirty="0"/>
+                <a:t>Agent</a:t>
+              </a:r>
+            </a:p>
+          </p:txBody>
+        </p:sp>
+        <p:grpSp>
+          <p:nvGrpSpPr>
+            <p:cNvPr id="53" name="Group 52">
+              <a:extLst>
+                <a:ext uri="{FF2B5EF4-FFF2-40B4-BE49-F238E27FC236}">
+                  <a16:creationId xmlns:a16="http://schemas.microsoft.com/office/drawing/2014/main" id="{6EACA6A5-6D6E-4501-BA64-461271C094B7}"/>
+                </a:ext>
+              </a:extLst>
+            </p:cNvPr>
+            <p:cNvGrpSpPr/>
+            <p:nvPr/>
+          </p:nvGrpSpPr>
+          <p:grpSpPr>
+            <a:xfrm>
+              <a:off x="729750" y="4180866"/>
+              <a:ext cx="1447299" cy="582520"/>
+              <a:chOff x="729750" y="4180866"/>
+              <a:chExt cx="1447299" cy="582520"/>
+            </a:xfrm>
+          </p:grpSpPr>
           <p:sp>
             <p:nvSpPr>
-              <p:cNvPr id="10" name="TextBox 9">
+              <p:cNvPr id="39" name="Rectangle 38">
                 <a:extLst>
                   <a:ext uri="{FF2B5EF4-FFF2-40B4-BE49-F238E27FC236}">
-                    <a16:creationId xmlns:a16="http://schemas.microsoft.com/office/drawing/2014/main" id="{7BF01E10-1A06-4B5D-9456-2DF2A3FCA21B}"/>
-                  </a:ext>
-                </a:extLst>
-              </p:cNvPr>
-              <p:cNvSpPr txBox="1"/>
-              <p:nvPr/>
-            </p:nvSpPr>
-            <p:spPr>
-              <a:xfrm>
-                <a:off x="9432133" y="1754720"/>
-                <a:ext cx="1737142" cy="923330"/>
-              </a:xfrm>
-              <a:prstGeom prst="rect">
-                <a:avLst/>
-              </a:prstGeom>
-              <a:noFill/>
-              <a:ln>
-                <a:solidFill>
-                  <a:schemeClr val="tx1"/>
-                </a:solidFill>
-              </a:ln>
-            </p:spPr>
-            <p:txBody>
-              <a:bodyPr wrap="none" rtlCol="1">
-                <a:spAutoFit/>
-              </a:bodyPr>
-              <a:lstStyle/>
-              <a:p>
-                <a:r>
-                  <a:rPr lang="en-US" dirty="0"/>
-                  <a:t>MADDPG agents</a:t>
-                </a:r>
-              </a:p>
-              <a:p>
-                <a:r>
-                  <a:rPr lang="en-US" dirty="0"/>
-                  <a:t>(pytorch)</a:t>
-                </a:r>
-              </a:p>
-              <a:p>
-                <a:endParaRPr lang="he-IL" dirty="0"/>
-              </a:p>
-            </p:txBody>
-          </p:sp>
-          <p:sp>
-            <p:nvSpPr>
-              <p:cNvPr id="11" name="Rectangle 10">
-                <a:extLst>
-                  <a:ext uri="{FF2B5EF4-FFF2-40B4-BE49-F238E27FC236}">
-                    <a16:creationId xmlns:a16="http://schemas.microsoft.com/office/drawing/2014/main" id="{9DC35EB6-5774-4936-B170-CEE5DFBF27F4}"/>
+                    <a16:creationId xmlns:a16="http://schemas.microsoft.com/office/drawing/2014/main" id="{86FA690F-3BBD-4777-89F6-14CBF1FBB702}"/>
                   </a:ext>
                 </a:extLst>
               </p:cNvPr>
@@ -3675,8 +4812,8 @@
             </p:nvSpPr>
             <p:spPr>
               <a:xfrm>
-                <a:off x="483262" y="1587935"/>
-                <a:ext cx="5104268" cy="3160234"/>
+                <a:off x="767689" y="4209973"/>
+                <a:ext cx="1409360" cy="553413"/>
               </a:xfrm>
               <a:prstGeom prst="rect">
                 <a:avLst/>
@@ -3714,57 +4851,10 @@
           </p:sp>
           <p:sp>
             <p:nvSpPr>
-              <p:cNvPr id="12" name="Rectangle 11">
+              <p:cNvPr id="40" name="TextBox 39">
                 <a:extLst>
                   <a:ext uri="{FF2B5EF4-FFF2-40B4-BE49-F238E27FC236}">
-                    <a16:creationId xmlns:a16="http://schemas.microsoft.com/office/drawing/2014/main" id="{1BE3B8D8-FCFD-481C-8885-794E3E11CD44}"/>
-                  </a:ext>
-                </a:extLst>
-              </p:cNvPr>
-              <p:cNvSpPr/>
-              <p:nvPr/>
-            </p:nvSpPr>
-            <p:spPr>
-              <a:xfrm>
-                <a:off x="6652470" y="723869"/>
-                <a:ext cx="4899170" cy="3160234"/>
-              </a:xfrm>
-              <a:prstGeom prst="rect">
-                <a:avLst/>
-              </a:prstGeom>
-              <a:noFill/>
-            </p:spPr>
-            <p:style>
-              <a:lnRef idx="2">
-                <a:schemeClr val="accent1">
-                  <a:shade val="50000"/>
-                </a:schemeClr>
-              </a:lnRef>
-              <a:fillRef idx="1">
-                <a:schemeClr val="accent1"/>
-              </a:fillRef>
-              <a:effectRef idx="0">
-                <a:schemeClr val="accent1"/>
-              </a:effectRef>
-              <a:fontRef idx="minor">
-                <a:schemeClr val="lt1"/>
-              </a:fontRef>
-            </p:style>
-            <p:txBody>
-              <a:bodyPr rtlCol="1" anchor="ctr"/>
-              <a:lstStyle/>
-              <a:p>
-                <a:pPr algn="ctr"/>
-                <a:endParaRPr lang="he-IL"/>
-              </a:p>
-            </p:txBody>
-          </p:sp>
-          <p:sp>
-            <p:nvSpPr>
-              <p:cNvPr id="13" name="TextBox 12">
-                <a:extLst>
-                  <a:ext uri="{FF2B5EF4-FFF2-40B4-BE49-F238E27FC236}">
-                    <a16:creationId xmlns:a16="http://schemas.microsoft.com/office/drawing/2014/main" id="{8D21829E-60D5-4299-A170-506DA4B777E2}"/>
+                    <a16:creationId xmlns:a16="http://schemas.microsoft.com/office/drawing/2014/main" id="{D16DFEA7-3868-4AFE-A044-CA1075F0B67A}"/>
                   </a:ext>
                 </a:extLst>
               </p:cNvPr>
@@ -3773,13 +4863,16 @@
             </p:nvSpPr>
             <p:spPr>
               <a:xfrm>
-                <a:off x="8675848" y="943841"/>
-                <a:ext cx="852413" cy="369332"/>
+                <a:off x="729750" y="4180866"/>
+                <a:ext cx="1442190" cy="369332"/>
               </a:xfrm>
               <a:prstGeom prst="rect">
                 <a:avLst/>
               </a:prstGeom>
               <a:noFill/>
+              <a:ln>
+                <a:noFill/>
+              </a:ln>
             </p:spPr>
             <p:txBody>
               <a:bodyPr wrap="none" rtlCol="1">
@@ -3788,194 +4881,19 @@
               <a:lstStyle/>
               <a:p>
                 <a:r>
-                  <a:rPr lang="en-US" dirty="0"/>
-                  <a:t>Python</a:t>
+                  <a:rPr lang="en-US" b="1" dirty="0"/>
+                  <a:t>Unity Physics</a:t>
                 </a:r>
-                <a:endParaRPr lang="he-IL" dirty="0"/>
               </a:p>
             </p:txBody>
           </p:sp>
-          <p:cxnSp>
-            <p:nvCxnSpPr>
-              <p:cNvPr id="19" name="Straight Arrow Connector 18">
-                <a:extLst>
-                  <a:ext uri="{FF2B5EF4-FFF2-40B4-BE49-F238E27FC236}">
-                    <a16:creationId xmlns:a16="http://schemas.microsoft.com/office/drawing/2014/main" id="{BD6E6BB2-7A3F-4881-A18C-35D618006FFA}"/>
-                  </a:ext>
-                </a:extLst>
-              </p:cNvPr>
-              <p:cNvCxnSpPr>
-                <a:cxnSpLocks/>
-                <a:stCxn id="8" idx="3"/>
-                <a:endCxn id="7" idx="1"/>
-              </p:cNvCxnSpPr>
-              <p:nvPr/>
-            </p:nvCxnSpPr>
-            <p:spPr>
-              <a:xfrm flipV="1">
-                <a:off x="5219975" y="2222250"/>
-                <a:ext cx="1833766" cy="584577"/>
-              </a:xfrm>
-              <a:prstGeom prst="straightConnector1">
-                <a:avLst/>
-              </a:prstGeom>
-              <a:ln w="76200">
-                <a:headEnd type="triangle"/>
-                <a:tailEnd type="triangle"/>
-              </a:ln>
-            </p:spPr>
-            <p:style>
-              <a:lnRef idx="1">
-                <a:schemeClr val="accent1"/>
-              </a:lnRef>
-              <a:fillRef idx="0">
-                <a:schemeClr val="accent1"/>
-              </a:fillRef>
-              <a:effectRef idx="0">
-                <a:schemeClr val="accent1"/>
-              </a:effectRef>
-              <a:fontRef idx="minor">
-                <a:schemeClr val="tx1"/>
-              </a:fontRef>
-            </p:style>
-          </p:cxnSp>
-          <p:cxnSp>
-            <p:nvCxnSpPr>
-              <p:cNvPr id="20" name="Straight Arrow Connector 19">
-                <a:extLst>
-                  <a:ext uri="{FF2B5EF4-FFF2-40B4-BE49-F238E27FC236}">
-                    <a16:creationId xmlns:a16="http://schemas.microsoft.com/office/drawing/2014/main" id="{7778C3E0-DDFC-4537-AAAE-3F442CC9EFB0}"/>
-                  </a:ext>
-                </a:extLst>
-              </p:cNvPr>
-              <p:cNvCxnSpPr>
-                <a:cxnSpLocks/>
-                <a:stCxn id="6" idx="3"/>
-                <a:endCxn id="8" idx="1"/>
-              </p:cNvCxnSpPr>
-              <p:nvPr/>
-            </p:nvCxnSpPr>
-            <p:spPr>
-              <a:xfrm flipV="1">
-                <a:off x="3110578" y="2806827"/>
-                <a:ext cx="797756" cy="301315"/>
-              </a:xfrm>
-              <a:prstGeom prst="straightConnector1">
-                <a:avLst/>
-              </a:prstGeom>
-              <a:ln w="76200">
-                <a:headEnd type="triangle"/>
-                <a:tailEnd type="triangle"/>
-              </a:ln>
-            </p:spPr>
-            <p:style>
-              <a:lnRef idx="1">
-                <a:schemeClr val="accent1"/>
-              </a:lnRef>
-              <a:fillRef idx="0">
-                <a:schemeClr val="accent1"/>
-              </a:fillRef>
-              <a:effectRef idx="0">
-                <a:schemeClr val="accent1"/>
-              </a:effectRef>
-              <a:fontRef idx="minor">
-                <a:schemeClr val="tx1"/>
-              </a:fontRef>
-            </p:style>
-          </p:cxnSp>
-          <p:cxnSp>
-            <p:nvCxnSpPr>
-              <p:cNvPr id="21" name="Straight Arrow Connector 20">
-                <a:extLst>
-                  <a:ext uri="{FF2B5EF4-FFF2-40B4-BE49-F238E27FC236}">
-                    <a16:creationId xmlns:a16="http://schemas.microsoft.com/office/drawing/2014/main" id="{D19F4ABA-C3C2-4162-92AE-899DA9AEBCF1}"/>
-                  </a:ext>
-                </a:extLst>
-              </p:cNvPr>
-              <p:cNvCxnSpPr>
-                <a:cxnSpLocks/>
-              </p:cNvCxnSpPr>
-              <p:nvPr/>
-            </p:nvCxnSpPr>
-            <p:spPr>
-              <a:xfrm>
-                <a:off x="8742838" y="2216385"/>
-                <a:ext cx="680906" cy="0"/>
-              </a:xfrm>
-              <a:prstGeom prst="straightConnector1">
-                <a:avLst/>
-              </a:prstGeom>
-              <a:ln w="76200">
-                <a:headEnd type="triangle"/>
-                <a:tailEnd type="triangle"/>
-              </a:ln>
-            </p:spPr>
-            <p:style>
-              <a:lnRef idx="1">
-                <a:schemeClr val="accent1"/>
-              </a:lnRef>
-              <a:fillRef idx="0">
-                <a:schemeClr val="accent1"/>
-              </a:fillRef>
-              <a:effectRef idx="0">
-                <a:schemeClr val="accent1"/>
-              </a:effectRef>
-              <a:fontRef idx="minor">
-                <a:schemeClr val="tx1"/>
-              </a:fontRef>
-            </p:style>
-          </p:cxnSp>
-          <p:cxnSp>
-            <p:nvCxnSpPr>
-              <p:cNvPr id="22" name="Straight Arrow Connector 21">
-                <a:extLst>
-                  <a:ext uri="{FF2B5EF4-FFF2-40B4-BE49-F238E27FC236}">
-                    <a16:creationId xmlns:a16="http://schemas.microsoft.com/office/drawing/2014/main" id="{BA5718FE-001F-4E49-8AAA-7A9DAE837033}"/>
-                  </a:ext>
-                </a:extLst>
-              </p:cNvPr>
-              <p:cNvCxnSpPr>
-                <a:cxnSpLocks/>
-                <a:stCxn id="6" idx="2"/>
-                <a:endCxn id="9" idx="0"/>
-              </p:cNvCxnSpPr>
-              <p:nvPr/>
-            </p:nvCxnSpPr>
-            <p:spPr>
-              <a:xfrm flipH="1">
-                <a:off x="1750009" y="3431307"/>
-                <a:ext cx="513959" cy="524291"/>
-              </a:xfrm>
-              <a:prstGeom prst="straightConnector1">
-                <a:avLst/>
-              </a:prstGeom>
-              <a:ln w="76200">
-                <a:headEnd type="triangle"/>
-                <a:tailEnd type="triangle"/>
-              </a:ln>
-            </p:spPr>
-            <p:style>
-              <a:lnRef idx="1">
-                <a:schemeClr val="accent1"/>
-              </a:lnRef>
-              <a:fillRef idx="0">
-                <a:schemeClr val="accent1"/>
-              </a:fillRef>
-              <a:effectRef idx="0">
-                <a:schemeClr val="accent1"/>
-              </a:effectRef>
-              <a:fontRef idx="minor">
-                <a:schemeClr val="tx1"/>
-              </a:fontRef>
-            </p:style>
-          </p:cxnSp>
         </p:grpSp>
         <p:sp>
           <p:nvSpPr>
-            <p:cNvPr id="24" name="TextBox 23">
+            <p:cNvPr id="41" name="TextBox 40">
               <a:extLst>
                 <a:ext uri="{FF2B5EF4-FFF2-40B4-BE49-F238E27FC236}">
-                  <a16:creationId xmlns:a16="http://schemas.microsoft.com/office/drawing/2014/main" id="{307E9038-3CF8-4ABE-BA58-71D5A700FEC4}"/>
+                  <a16:creationId xmlns:a16="http://schemas.microsoft.com/office/drawing/2014/main" id="{48684C2A-E73F-49FD-BC53-0297BA48A479}"/>
                 </a:ext>
               </a:extLst>
             </p:cNvPr>
@@ -3984,8 +4902,8 @@
           </p:nvSpPr>
           <p:spPr>
             <a:xfrm>
-              <a:off x="3057041" y="3969773"/>
-              <a:ext cx="2081275" cy="646331"/>
+              <a:off x="8098236" y="2667907"/>
+              <a:ext cx="1238609" cy="369332"/>
             </a:xfrm>
             <a:prstGeom prst="rect">
               <a:avLst/>
@@ -4005,66 +4923,1448 @@
             <a:p>
               <a:r>
                 <a:rPr lang="en-US" dirty="0"/>
-                <a:t>Collect observations</a:t>
-              </a:r>
-            </a:p>
-            <a:p>
-              <a:r>
-                <a:rPr lang="en-US" dirty="0"/>
-                <a:t>and rewards</a:t>
+                <a:t>Race Agent</a:t>
               </a:r>
             </a:p>
           </p:txBody>
         </p:sp>
-        <p:cxnSp>
-          <p:nvCxnSpPr>
-            <p:cNvPr id="25" name="Straight Arrow Connector 24">
+        <p:sp>
+          <p:nvSpPr>
+            <p:cNvPr id="42" name="TextBox 41">
               <a:extLst>
                 <a:ext uri="{FF2B5EF4-FFF2-40B4-BE49-F238E27FC236}">
-                  <a16:creationId xmlns:a16="http://schemas.microsoft.com/office/drawing/2014/main" id="{DCE64A49-5D61-47A7-A4FD-BC2846FB3BDE}"/>
+                  <a16:creationId xmlns:a16="http://schemas.microsoft.com/office/drawing/2014/main" id="{D0987D57-075E-43A3-B9A5-4C6D854A702C}"/>
                 </a:ext>
               </a:extLst>
             </p:cNvPr>
-            <p:cNvCxnSpPr>
-              <a:cxnSpLocks/>
-              <a:stCxn id="6" idx="2"/>
-              <a:endCxn id="24" idx="0"/>
-            </p:cNvCxnSpPr>
+            <p:cNvSpPr txBox="1"/>
             <p:nvPr/>
-          </p:nvCxnSpPr>
+          </p:nvSpPr>
           <p:spPr>
             <a:xfrm>
-              <a:off x="2263968" y="3431307"/>
-              <a:ext cx="1833711" cy="538466"/>
+              <a:off x="7605088" y="2018551"/>
+              <a:ext cx="2224135" cy="369332"/>
             </a:xfrm>
-            <a:prstGeom prst="straightConnector1">
+            <a:prstGeom prst="rect">
               <a:avLst/>
             </a:prstGeom>
-            <a:ln w="76200">
-              <a:headEnd type="triangle"/>
-              <a:tailEnd type="triangle"/>
+            <a:noFill/>
+            <a:ln>
+              <a:solidFill>
+                <a:schemeClr val="tx1"/>
+              </a:solidFill>
             </a:ln>
           </p:spPr>
-          <p:style>
-            <a:lnRef idx="1">
-              <a:schemeClr val="accent1"/>
-            </a:lnRef>
-            <a:fillRef idx="0">
-              <a:schemeClr val="accent1"/>
-            </a:fillRef>
-            <a:effectRef idx="0">
-              <a:schemeClr val="accent1"/>
-            </a:effectRef>
-            <a:fontRef idx="minor">
-              <a:schemeClr val="tx1"/>
-            </a:fontRef>
-          </p:style>
-        </p:cxnSp>
+          <p:txBody>
+            <a:bodyPr wrap="none" rtlCol="1">
+              <a:spAutoFit/>
+            </a:bodyPr>
+            <a:lstStyle/>
+            <a:p>
+              <a:r>
+                <a:rPr lang="en-US" dirty="0"/>
+                <a:t>Race Agents Manager</a:t>
+              </a:r>
+            </a:p>
+          </p:txBody>
+        </p:sp>
+        <p:sp>
+          <p:nvSpPr>
+            <p:cNvPr id="43" name="TextBox 42">
+              <a:extLst>
+                <a:ext uri="{FF2B5EF4-FFF2-40B4-BE49-F238E27FC236}">
+                  <a16:creationId xmlns:a16="http://schemas.microsoft.com/office/drawing/2014/main" id="{7A7DC8D0-4EFC-4580-B9E1-07E8B4CD90FA}"/>
+                </a:ext>
+              </a:extLst>
+            </p:cNvPr>
+            <p:cNvSpPr txBox="1"/>
+            <p:nvPr/>
+          </p:nvSpPr>
+          <p:spPr>
+            <a:xfrm>
+              <a:off x="4804014" y="5864201"/>
+              <a:ext cx="1240532" cy="369332"/>
+            </a:xfrm>
+            <a:prstGeom prst="rect">
+              <a:avLst/>
+            </a:prstGeom>
+            <a:noFill/>
+            <a:ln>
+              <a:solidFill>
+                <a:schemeClr val="tx1"/>
+              </a:solidFill>
+            </a:ln>
+          </p:spPr>
+          <p:txBody>
+            <a:bodyPr wrap="none" rtlCol="1">
+              <a:spAutoFit/>
+            </a:bodyPr>
+            <a:lstStyle/>
+            <a:p>
+              <a:r>
+                <a:rPr lang="en-US" dirty="0"/>
+                <a:t>Checkpoint</a:t>
+              </a:r>
+            </a:p>
+          </p:txBody>
+        </p:sp>
+        <p:sp>
+          <p:nvSpPr>
+            <p:cNvPr id="44" name="TextBox 43">
+              <a:extLst>
+                <a:ext uri="{FF2B5EF4-FFF2-40B4-BE49-F238E27FC236}">
+                  <a16:creationId xmlns:a16="http://schemas.microsoft.com/office/drawing/2014/main" id="{E6CB0BE7-272F-4E38-8BDB-9EA659304BBC}"/>
+                </a:ext>
+              </a:extLst>
+            </p:cNvPr>
+            <p:cNvSpPr txBox="1"/>
+            <p:nvPr/>
+          </p:nvSpPr>
+          <p:spPr>
+            <a:xfrm>
+              <a:off x="10181044" y="3529767"/>
+              <a:ext cx="1611275" cy="369332"/>
+            </a:xfrm>
+            <a:prstGeom prst="rect">
+              <a:avLst/>
+            </a:prstGeom>
+            <a:noFill/>
+            <a:ln>
+              <a:solidFill>
+                <a:schemeClr val="tx1"/>
+              </a:solidFill>
+            </a:ln>
+          </p:spPr>
+          <p:txBody>
+            <a:bodyPr wrap="none" rtlCol="1">
+              <a:spAutoFit/>
+            </a:bodyPr>
+            <a:lstStyle/>
+            <a:p>
+              <a:r>
+                <a:rPr lang="en-US" dirty="0"/>
+                <a:t>Reward System</a:t>
+              </a:r>
+            </a:p>
+          </p:txBody>
+        </p:sp>
+        <p:sp>
+          <p:nvSpPr>
+            <p:cNvPr id="45" name="TextBox 44">
+              <a:extLst>
+                <a:ext uri="{FF2B5EF4-FFF2-40B4-BE49-F238E27FC236}">
+                  <a16:creationId xmlns:a16="http://schemas.microsoft.com/office/drawing/2014/main" id="{007B8963-1F65-479F-A07A-FD65BB0A72CF}"/>
+                </a:ext>
+              </a:extLst>
+            </p:cNvPr>
+            <p:cNvSpPr txBox="1"/>
+            <p:nvPr/>
+          </p:nvSpPr>
+          <p:spPr>
+            <a:xfrm>
+              <a:off x="5691887" y="4306652"/>
+              <a:ext cx="1493294" cy="369332"/>
+            </a:xfrm>
+            <a:prstGeom prst="rect">
+              <a:avLst/>
+            </a:prstGeom>
+            <a:noFill/>
+            <a:ln>
+              <a:solidFill>
+                <a:schemeClr val="tx1"/>
+              </a:solidFill>
+            </a:ln>
+          </p:spPr>
+          <p:txBody>
+            <a:bodyPr wrap="none" rtlCol="1">
+              <a:spAutoFit/>
+            </a:bodyPr>
+            <a:lstStyle/>
+            <a:p>
+              <a:r>
+                <a:rPr lang="en-US" dirty="0"/>
+                <a:t>Car Controller</a:t>
+              </a:r>
+            </a:p>
+          </p:txBody>
+        </p:sp>
+        <p:sp>
+          <p:nvSpPr>
+            <p:cNvPr id="46" name="TextBox 45">
+              <a:extLst>
+                <a:ext uri="{FF2B5EF4-FFF2-40B4-BE49-F238E27FC236}">
+                  <a16:creationId xmlns:a16="http://schemas.microsoft.com/office/drawing/2014/main" id="{B15431A0-F947-4158-87EF-D974900CDB5D}"/>
+                </a:ext>
+              </a:extLst>
+            </p:cNvPr>
+            <p:cNvSpPr txBox="1"/>
+            <p:nvPr/>
+          </p:nvSpPr>
+          <p:spPr>
+            <a:xfrm>
+              <a:off x="4987129" y="784071"/>
+              <a:ext cx="1085425" cy="369332"/>
+            </a:xfrm>
+            <a:prstGeom prst="rect">
+              <a:avLst/>
+            </a:prstGeom>
+            <a:noFill/>
+            <a:ln>
+              <a:solidFill>
+                <a:schemeClr val="tx1"/>
+              </a:solidFill>
+            </a:ln>
+          </p:spPr>
+          <p:txBody>
+            <a:bodyPr wrap="none" rtlCol="1">
+              <a:spAutoFit/>
+            </a:bodyPr>
+            <a:lstStyle/>
+            <a:p>
+              <a:r>
+                <a:rPr lang="en-US" dirty="0"/>
+                <a:t>Obstacles</a:t>
+              </a:r>
+            </a:p>
+          </p:txBody>
+        </p:sp>
+        <p:grpSp>
+          <p:nvGrpSpPr>
+            <p:cNvPr id="56" name="Group 55">
+              <a:extLst>
+                <a:ext uri="{FF2B5EF4-FFF2-40B4-BE49-F238E27FC236}">
+                  <a16:creationId xmlns:a16="http://schemas.microsoft.com/office/drawing/2014/main" id="{5171F686-765C-427D-943B-9BECEE3E23D6}"/>
+                </a:ext>
+              </a:extLst>
+            </p:cNvPr>
+            <p:cNvGrpSpPr/>
+            <p:nvPr/>
+          </p:nvGrpSpPr>
+          <p:grpSpPr>
+            <a:xfrm>
+              <a:off x="2177049" y="4486680"/>
+              <a:ext cx="3514838" cy="507297"/>
+              <a:chOff x="2177049" y="4486680"/>
+              <a:chExt cx="3514838" cy="507297"/>
+            </a:xfrm>
+          </p:grpSpPr>
+          <p:cxnSp>
+            <p:nvCxnSpPr>
+              <p:cNvPr id="47" name="Straight Arrow Connector 46">
+                <a:extLst>
+                  <a:ext uri="{FF2B5EF4-FFF2-40B4-BE49-F238E27FC236}">
+                    <a16:creationId xmlns:a16="http://schemas.microsoft.com/office/drawing/2014/main" id="{2FBD5633-7EF2-46C5-A206-DFE518DE6EB0}"/>
+                  </a:ext>
+                </a:extLst>
+              </p:cNvPr>
+              <p:cNvCxnSpPr>
+                <a:cxnSpLocks/>
+                <a:stCxn id="45" idx="1"/>
+                <a:endCxn id="39" idx="3"/>
+              </p:cNvCxnSpPr>
+              <p:nvPr/>
+            </p:nvCxnSpPr>
+            <p:spPr>
+              <a:xfrm flipH="1" flipV="1">
+                <a:off x="2177049" y="4486680"/>
+                <a:ext cx="3514838" cy="4638"/>
+              </a:xfrm>
+              <a:prstGeom prst="straightConnector1">
+                <a:avLst/>
+              </a:prstGeom>
+              <a:ln w="28575">
+                <a:headEnd type="none" w="med" len="med"/>
+                <a:tailEnd type="triangle" w="med" len="med"/>
+              </a:ln>
+            </p:spPr>
+            <p:style>
+              <a:lnRef idx="1">
+                <a:schemeClr val="accent1"/>
+              </a:lnRef>
+              <a:fillRef idx="0">
+                <a:schemeClr val="accent1"/>
+              </a:fillRef>
+              <a:effectRef idx="0">
+                <a:schemeClr val="accent1"/>
+              </a:effectRef>
+              <a:fontRef idx="minor">
+                <a:schemeClr val="tx1"/>
+              </a:fontRef>
+            </p:style>
+          </p:cxnSp>
+          <p:sp>
+            <p:nvSpPr>
+              <p:cNvPr id="55" name="TextBox 54">
+                <a:extLst>
+                  <a:ext uri="{FF2B5EF4-FFF2-40B4-BE49-F238E27FC236}">
+                    <a16:creationId xmlns:a16="http://schemas.microsoft.com/office/drawing/2014/main" id="{7A01237D-D1DF-4CFC-850E-14435B178C27}"/>
+                  </a:ext>
+                </a:extLst>
+              </p:cNvPr>
+              <p:cNvSpPr txBox="1"/>
+              <p:nvPr/>
+            </p:nvSpPr>
+            <p:spPr>
+              <a:xfrm>
+                <a:off x="3066596" y="4532312"/>
+                <a:ext cx="1690192" cy="461665"/>
+              </a:xfrm>
+              <a:prstGeom prst="rect">
+                <a:avLst/>
+              </a:prstGeom>
+              <a:noFill/>
+              <a:ln w="6350">
+                <a:noFill/>
+              </a:ln>
+            </p:spPr>
+            <p:txBody>
+              <a:bodyPr wrap="square" rtlCol="1">
+                <a:spAutoFit/>
+              </a:bodyPr>
+              <a:lstStyle/>
+              <a:p>
+                <a:r>
+                  <a:rPr lang="en-US" sz="1200" dirty="0"/>
+                  <a:t>Convert Inputs to Unity Physics (wheel colliders)</a:t>
+                </a:r>
+                <a:endParaRPr lang="he-IL" sz="1200" dirty="0"/>
+              </a:p>
+            </p:txBody>
+          </p:sp>
+        </p:grpSp>
+        <p:grpSp>
+          <p:nvGrpSpPr>
+            <p:cNvPr id="65" name="Group 64">
+              <a:extLst>
+                <a:ext uri="{FF2B5EF4-FFF2-40B4-BE49-F238E27FC236}">
+                  <a16:creationId xmlns:a16="http://schemas.microsoft.com/office/drawing/2014/main" id="{20E8179A-F9EF-4487-A257-C478758BB193}"/>
+                </a:ext>
+              </a:extLst>
+            </p:cNvPr>
+            <p:cNvGrpSpPr/>
+            <p:nvPr/>
+          </p:nvGrpSpPr>
+          <p:grpSpPr>
+            <a:xfrm>
+              <a:off x="2170472" y="3037239"/>
+              <a:ext cx="6547069" cy="1449441"/>
+              <a:chOff x="2170472" y="3037239"/>
+              <a:chExt cx="6547069" cy="1449441"/>
+            </a:xfrm>
+          </p:grpSpPr>
+          <p:cxnSp>
+            <p:nvCxnSpPr>
+              <p:cNvPr id="57" name="Straight Arrow Connector 56">
+                <a:extLst>
+                  <a:ext uri="{FF2B5EF4-FFF2-40B4-BE49-F238E27FC236}">
+                    <a16:creationId xmlns:a16="http://schemas.microsoft.com/office/drawing/2014/main" id="{15AC3BA1-9A18-42F6-A5A0-7F13417B15A2}"/>
+                  </a:ext>
+                </a:extLst>
+              </p:cNvPr>
+              <p:cNvCxnSpPr>
+                <a:cxnSpLocks/>
+                <a:stCxn id="39" idx="3"/>
+                <a:endCxn id="41" idx="2"/>
+              </p:cNvCxnSpPr>
+              <p:nvPr/>
+            </p:nvCxnSpPr>
+            <p:spPr>
+              <a:xfrm flipV="1">
+                <a:off x="2177049" y="3037239"/>
+                <a:ext cx="6540492" cy="1449441"/>
+              </a:xfrm>
+              <a:prstGeom prst="straightConnector1">
+                <a:avLst/>
+              </a:prstGeom>
+              <a:ln w="28575">
+                <a:headEnd type="none" w="med" len="med"/>
+                <a:tailEnd type="triangle" w="med" len="med"/>
+              </a:ln>
+            </p:spPr>
+            <p:style>
+              <a:lnRef idx="1">
+                <a:schemeClr val="accent1"/>
+              </a:lnRef>
+              <a:fillRef idx="0">
+                <a:schemeClr val="accent1"/>
+              </a:fillRef>
+              <a:effectRef idx="0">
+                <a:schemeClr val="accent1"/>
+              </a:effectRef>
+              <a:fontRef idx="minor">
+                <a:schemeClr val="tx1"/>
+              </a:fontRef>
+            </p:style>
+          </p:cxnSp>
+          <p:sp>
+            <p:nvSpPr>
+              <p:cNvPr id="62" name="TextBox 61">
+                <a:extLst>
+                  <a:ext uri="{FF2B5EF4-FFF2-40B4-BE49-F238E27FC236}">
+                    <a16:creationId xmlns:a16="http://schemas.microsoft.com/office/drawing/2014/main" id="{0257570D-F495-49E0-8705-4B1810AADA10}"/>
+                  </a:ext>
+                </a:extLst>
+              </p:cNvPr>
+              <p:cNvSpPr txBox="1"/>
+              <p:nvPr/>
+            </p:nvSpPr>
+            <p:spPr>
+              <a:xfrm>
+                <a:off x="2170472" y="3751316"/>
+                <a:ext cx="1741220" cy="461665"/>
+              </a:xfrm>
+              <a:prstGeom prst="rect">
+                <a:avLst/>
+              </a:prstGeom>
+              <a:noFill/>
+            </p:spPr>
+            <p:txBody>
+              <a:bodyPr wrap="square" rtlCol="1">
+                <a:spAutoFit/>
+              </a:bodyPr>
+              <a:lstStyle/>
+              <a:p>
+                <a:r>
+                  <a:rPr lang="en-US" sz="1200" dirty="0"/>
+                  <a:t>Collision Signal,</a:t>
+                </a:r>
+              </a:p>
+              <a:p>
+                <a:r>
+                  <a:rPr lang="en-US" sz="1200" dirty="0"/>
+                  <a:t>and raw observations</a:t>
+                </a:r>
+                <a:endParaRPr lang="he-IL" sz="1200" dirty="0"/>
+              </a:p>
+            </p:txBody>
+          </p:sp>
+        </p:grpSp>
+        <p:grpSp>
+          <p:nvGrpSpPr>
+            <p:cNvPr id="66" name="Group 65">
+              <a:extLst>
+                <a:ext uri="{FF2B5EF4-FFF2-40B4-BE49-F238E27FC236}">
+                  <a16:creationId xmlns:a16="http://schemas.microsoft.com/office/drawing/2014/main" id="{86CFEE1F-2CC4-4EE4-8417-D54011695BB5}"/>
+                </a:ext>
+              </a:extLst>
+            </p:cNvPr>
+            <p:cNvGrpSpPr/>
+            <p:nvPr/>
+          </p:nvGrpSpPr>
+          <p:grpSpPr>
+            <a:xfrm>
+              <a:off x="2177049" y="4486680"/>
+              <a:ext cx="2626965" cy="1562187"/>
+              <a:chOff x="2024649" y="4334280"/>
+              <a:chExt cx="2626965" cy="1562187"/>
+            </a:xfrm>
+          </p:grpSpPr>
+          <p:cxnSp>
+            <p:nvCxnSpPr>
+              <p:cNvPr id="67" name="Straight Arrow Connector 66">
+                <a:extLst>
+                  <a:ext uri="{FF2B5EF4-FFF2-40B4-BE49-F238E27FC236}">
+                    <a16:creationId xmlns:a16="http://schemas.microsoft.com/office/drawing/2014/main" id="{D899678B-8EDE-4D00-8BB6-4B43452E3EFD}"/>
+                  </a:ext>
+                </a:extLst>
+              </p:cNvPr>
+              <p:cNvCxnSpPr>
+                <a:cxnSpLocks/>
+                <a:stCxn id="39" idx="3"/>
+                <a:endCxn id="43" idx="1"/>
+              </p:cNvCxnSpPr>
+              <p:nvPr/>
+            </p:nvCxnSpPr>
+            <p:spPr>
+              <a:xfrm>
+                <a:off x="2024649" y="4334280"/>
+                <a:ext cx="2626965" cy="1562187"/>
+              </a:xfrm>
+              <a:prstGeom prst="straightConnector1">
+                <a:avLst/>
+              </a:prstGeom>
+              <a:ln w="28575">
+                <a:headEnd type="none" w="med" len="med"/>
+                <a:tailEnd type="triangle" w="med" len="med"/>
+              </a:ln>
+            </p:spPr>
+            <p:style>
+              <a:lnRef idx="1">
+                <a:schemeClr val="accent1"/>
+              </a:lnRef>
+              <a:fillRef idx="0">
+                <a:schemeClr val="accent1"/>
+              </a:fillRef>
+              <a:effectRef idx="0">
+                <a:schemeClr val="accent1"/>
+              </a:effectRef>
+              <a:fontRef idx="minor">
+                <a:schemeClr val="tx1"/>
+              </a:fontRef>
+            </p:style>
+          </p:cxnSp>
+          <p:sp>
+            <p:nvSpPr>
+              <p:cNvPr id="68" name="TextBox 67">
+                <a:extLst>
+                  <a:ext uri="{FF2B5EF4-FFF2-40B4-BE49-F238E27FC236}">
+                    <a16:creationId xmlns:a16="http://schemas.microsoft.com/office/drawing/2014/main" id="{4F29855D-B094-4224-B7A8-7CF773E80D36}"/>
+                  </a:ext>
+                </a:extLst>
+              </p:cNvPr>
+              <p:cNvSpPr txBox="1"/>
+              <p:nvPr/>
+            </p:nvSpPr>
+            <p:spPr>
+              <a:xfrm>
+                <a:off x="2051625" y="5002091"/>
+                <a:ext cx="1389415" cy="276999"/>
+              </a:xfrm>
+              <a:prstGeom prst="rect">
+                <a:avLst/>
+              </a:prstGeom>
+              <a:noFill/>
+            </p:spPr>
+            <p:txBody>
+              <a:bodyPr wrap="square" rtlCol="1">
+                <a:spAutoFit/>
+              </a:bodyPr>
+              <a:lstStyle/>
+              <a:p>
+                <a:r>
+                  <a:rPr lang="en-US" sz="1200" dirty="0"/>
+                  <a:t>Checkpoint Trigger</a:t>
+                </a:r>
+                <a:endParaRPr lang="he-IL" sz="1200" dirty="0"/>
+              </a:p>
+            </p:txBody>
+          </p:sp>
+        </p:grpSp>
+        <p:grpSp>
+          <p:nvGrpSpPr>
+            <p:cNvPr id="71" name="Group 70">
+              <a:extLst>
+                <a:ext uri="{FF2B5EF4-FFF2-40B4-BE49-F238E27FC236}">
+                  <a16:creationId xmlns:a16="http://schemas.microsoft.com/office/drawing/2014/main" id="{6493CF4E-9BF7-4A47-B39F-E3D5DCA09299}"/>
+                </a:ext>
+              </a:extLst>
+            </p:cNvPr>
+            <p:cNvGrpSpPr/>
+            <p:nvPr/>
+          </p:nvGrpSpPr>
+          <p:grpSpPr>
+            <a:xfrm>
+              <a:off x="2088035" y="1972945"/>
+              <a:ext cx="2668753" cy="461665"/>
+              <a:chOff x="2061488" y="4106626"/>
+              <a:chExt cx="2668753" cy="461665"/>
+            </a:xfrm>
+          </p:grpSpPr>
+          <p:cxnSp>
+            <p:nvCxnSpPr>
+              <p:cNvPr id="72" name="Straight Arrow Connector 71">
+                <a:extLst>
+                  <a:ext uri="{FF2B5EF4-FFF2-40B4-BE49-F238E27FC236}">
+                    <a16:creationId xmlns:a16="http://schemas.microsoft.com/office/drawing/2014/main" id="{304B3B72-055A-4916-AB76-4407EDEA1FB7}"/>
+                  </a:ext>
+                </a:extLst>
+              </p:cNvPr>
+              <p:cNvCxnSpPr>
+                <a:cxnSpLocks/>
+                <a:stCxn id="37" idx="3"/>
+                <a:endCxn id="18" idx="1"/>
+              </p:cNvCxnSpPr>
+              <p:nvPr/>
+            </p:nvCxnSpPr>
+            <p:spPr>
+              <a:xfrm>
+                <a:off x="2061488" y="4334945"/>
+                <a:ext cx="2668753" cy="1953"/>
+              </a:xfrm>
+              <a:prstGeom prst="straightConnector1">
+                <a:avLst/>
+              </a:prstGeom>
+              <a:ln w="28575">
+                <a:headEnd type="triangle" w="med" len="med"/>
+                <a:tailEnd type="triangle" w="med" len="med"/>
+              </a:ln>
+            </p:spPr>
+            <p:style>
+              <a:lnRef idx="1">
+                <a:schemeClr val="accent1"/>
+              </a:lnRef>
+              <a:fillRef idx="0">
+                <a:schemeClr val="accent1"/>
+              </a:fillRef>
+              <a:effectRef idx="0">
+                <a:schemeClr val="accent1"/>
+              </a:effectRef>
+              <a:fontRef idx="minor">
+                <a:schemeClr val="tx1"/>
+              </a:fontRef>
+            </p:style>
+          </p:cxnSp>
+          <p:sp>
+            <p:nvSpPr>
+              <p:cNvPr id="73" name="TextBox 72">
+                <a:extLst>
+                  <a:ext uri="{FF2B5EF4-FFF2-40B4-BE49-F238E27FC236}">
+                    <a16:creationId xmlns:a16="http://schemas.microsoft.com/office/drawing/2014/main" id="{5FCBE834-E1C1-43BB-B0B9-55E6906FC14C}"/>
+                  </a:ext>
+                </a:extLst>
+              </p:cNvPr>
+              <p:cNvSpPr txBox="1"/>
+              <p:nvPr/>
+            </p:nvSpPr>
+            <p:spPr>
+              <a:xfrm>
+                <a:off x="3078901" y="4106626"/>
+                <a:ext cx="1389415" cy="461665"/>
+              </a:xfrm>
+              <a:prstGeom prst="rect">
+                <a:avLst/>
+              </a:prstGeom>
+              <a:noFill/>
+            </p:spPr>
+            <p:txBody>
+              <a:bodyPr wrap="square" rtlCol="1">
+                <a:spAutoFit/>
+              </a:bodyPr>
+              <a:lstStyle/>
+              <a:p>
+                <a:r>
+                  <a:rPr lang="en-US" sz="1200" dirty="0"/>
+                  <a:t>Base Class, environment  info </a:t>
+                </a:r>
+                <a:endParaRPr lang="he-IL" sz="1200" dirty="0"/>
+              </a:p>
+            </p:txBody>
+          </p:sp>
+        </p:grpSp>
+        <p:grpSp>
+          <p:nvGrpSpPr>
+            <p:cNvPr id="76" name="Group 75">
+              <a:extLst>
+                <a:ext uri="{FF2B5EF4-FFF2-40B4-BE49-F238E27FC236}">
+                  <a16:creationId xmlns:a16="http://schemas.microsoft.com/office/drawing/2014/main" id="{F5EE68F5-7C1E-4011-A4B9-AD509C67F8FC}"/>
+                </a:ext>
+              </a:extLst>
+            </p:cNvPr>
+            <p:cNvGrpSpPr/>
+            <p:nvPr/>
+          </p:nvGrpSpPr>
+          <p:grpSpPr>
+            <a:xfrm>
+              <a:off x="1852596" y="2806099"/>
+              <a:ext cx="6245640" cy="646331"/>
+              <a:chOff x="1673649" y="4787380"/>
+              <a:chExt cx="6245640" cy="646331"/>
+            </a:xfrm>
+          </p:grpSpPr>
+          <p:cxnSp>
+            <p:nvCxnSpPr>
+              <p:cNvPr id="77" name="Straight Arrow Connector 76">
+                <a:extLst>
+                  <a:ext uri="{FF2B5EF4-FFF2-40B4-BE49-F238E27FC236}">
+                    <a16:creationId xmlns:a16="http://schemas.microsoft.com/office/drawing/2014/main" id="{1DBA9D83-344F-427A-A1BD-AE10613EB2C9}"/>
+                  </a:ext>
+                </a:extLst>
+              </p:cNvPr>
+              <p:cNvCxnSpPr>
+                <a:cxnSpLocks/>
+                <a:stCxn id="38" idx="3"/>
+                <a:endCxn id="41" idx="1"/>
+              </p:cNvCxnSpPr>
+              <p:nvPr/>
+            </p:nvCxnSpPr>
+            <p:spPr>
+              <a:xfrm>
+                <a:off x="1673649" y="4828876"/>
+                <a:ext cx="6245640" cy="4978"/>
+              </a:xfrm>
+              <a:prstGeom prst="straightConnector1">
+                <a:avLst/>
+              </a:prstGeom>
+              <a:ln w="28575">
+                <a:headEnd type="triangle" w="med" len="med"/>
+                <a:tailEnd type="triangle" w="med" len="med"/>
+              </a:ln>
+            </p:spPr>
+            <p:style>
+              <a:lnRef idx="1">
+                <a:schemeClr val="accent1"/>
+              </a:lnRef>
+              <a:fillRef idx="0">
+                <a:schemeClr val="accent1"/>
+              </a:fillRef>
+              <a:effectRef idx="0">
+                <a:schemeClr val="accent1"/>
+              </a:effectRef>
+              <a:fontRef idx="minor">
+                <a:schemeClr val="tx1"/>
+              </a:fontRef>
+            </p:style>
+          </p:cxnSp>
+          <p:sp>
+            <p:nvSpPr>
+              <p:cNvPr id="78" name="TextBox 77">
+                <a:extLst>
+                  <a:ext uri="{FF2B5EF4-FFF2-40B4-BE49-F238E27FC236}">
+                    <a16:creationId xmlns:a16="http://schemas.microsoft.com/office/drawing/2014/main" id="{770630FC-88F5-4230-9591-20D54C8578AD}"/>
+                  </a:ext>
+                </a:extLst>
+              </p:cNvPr>
+              <p:cNvSpPr txBox="1"/>
+              <p:nvPr/>
+            </p:nvSpPr>
+            <p:spPr>
+              <a:xfrm>
+                <a:off x="2531578" y="4787380"/>
+                <a:ext cx="1479714" cy="646331"/>
+              </a:xfrm>
+              <a:prstGeom prst="rect">
+                <a:avLst/>
+              </a:prstGeom>
+              <a:noFill/>
+            </p:spPr>
+            <p:txBody>
+              <a:bodyPr wrap="square" rtlCol="1">
+                <a:spAutoFit/>
+              </a:bodyPr>
+              <a:lstStyle/>
+              <a:p>
+                <a:r>
+                  <a:rPr lang="en-US" sz="1200" dirty="0"/>
+                  <a:t>Base Class.</a:t>
+                </a:r>
+              </a:p>
+              <a:p>
+                <a:r>
+                  <a:rPr lang="en-US" sz="1200" dirty="0"/>
+                  <a:t>Send observations, </a:t>
+                </a:r>
+              </a:p>
+              <a:p>
+                <a:r>
+                  <a:rPr lang="en-US" sz="1200" dirty="0"/>
+                  <a:t>rewards and actions</a:t>
+                </a:r>
+                <a:endParaRPr lang="he-IL" sz="1200" dirty="0"/>
+              </a:p>
+            </p:txBody>
+          </p:sp>
+        </p:grpSp>
+        <p:grpSp>
+          <p:nvGrpSpPr>
+            <p:cNvPr id="90" name="Group 89">
+              <a:extLst>
+                <a:ext uri="{FF2B5EF4-FFF2-40B4-BE49-F238E27FC236}">
+                  <a16:creationId xmlns:a16="http://schemas.microsoft.com/office/drawing/2014/main" id="{EAC3C224-9ED4-4122-99B1-DB8D2D086705}"/>
+                </a:ext>
+              </a:extLst>
+            </p:cNvPr>
+            <p:cNvGrpSpPr/>
+            <p:nvPr/>
+          </p:nvGrpSpPr>
+          <p:grpSpPr>
+            <a:xfrm>
+              <a:off x="9336845" y="2852573"/>
+              <a:ext cx="2246231" cy="861860"/>
+              <a:chOff x="4964778" y="4693399"/>
+              <a:chExt cx="2246231" cy="861860"/>
+            </a:xfrm>
+          </p:grpSpPr>
+          <p:cxnSp>
+            <p:nvCxnSpPr>
+              <p:cNvPr id="91" name="Straight Arrow Connector 90">
+                <a:extLst>
+                  <a:ext uri="{FF2B5EF4-FFF2-40B4-BE49-F238E27FC236}">
+                    <a16:creationId xmlns:a16="http://schemas.microsoft.com/office/drawing/2014/main" id="{A64EF3D1-F67E-4F51-934D-5116E202FDC2}"/>
+                  </a:ext>
+                </a:extLst>
+              </p:cNvPr>
+              <p:cNvCxnSpPr>
+                <a:cxnSpLocks/>
+                <a:stCxn id="41" idx="3"/>
+                <a:endCxn id="44" idx="1"/>
+              </p:cNvCxnSpPr>
+              <p:nvPr/>
+            </p:nvCxnSpPr>
+            <p:spPr>
+              <a:xfrm>
+                <a:off x="4964778" y="4693399"/>
+                <a:ext cx="844199" cy="861860"/>
+              </a:xfrm>
+              <a:prstGeom prst="straightConnector1">
+                <a:avLst/>
+              </a:prstGeom>
+              <a:ln w="28575">
+                <a:headEnd type="triangle" w="med" len="med"/>
+                <a:tailEnd type="triangle" w="med" len="med"/>
+              </a:ln>
+            </p:spPr>
+            <p:style>
+              <a:lnRef idx="1">
+                <a:schemeClr val="accent1"/>
+              </a:lnRef>
+              <a:fillRef idx="0">
+                <a:schemeClr val="accent1"/>
+              </a:fillRef>
+              <a:effectRef idx="0">
+                <a:schemeClr val="accent1"/>
+              </a:effectRef>
+              <a:fontRef idx="minor">
+                <a:schemeClr val="tx1"/>
+              </a:fontRef>
+            </p:style>
+          </p:cxnSp>
+          <p:sp>
+            <p:nvSpPr>
+              <p:cNvPr id="92" name="TextBox 91">
+                <a:extLst>
+                  <a:ext uri="{FF2B5EF4-FFF2-40B4-BE49-F238E27FC236}">
+                    <a16:creationId xmlns:a16="http://schemas.microsoft.com/office/drawing/2014/main" id="{50D54D37-48A7-42FB-B664-9827F2336513}"/>
+                  </a:ext>
+                </a:extLst>
+              </p:cNvPr>
+              <p:cNvSpPr txBox="1"/>
+              <p:nvPr/>
+            </p:nvSpPr>
+            <p:spPr>
+              <a:xfrm>
+                <a:off x="5821594" y="5076998"/>
+                <a:ext cx="1389415" cy="276999"/>
+              </a:xfrm>
+              <a:prstGeom prst="rect">
+                <a:avLst/>
+              </a:prstGeom>
+              <a:noFill/>
+            </p:spPr>
+            <p:txBody>
+              <a:bodyPr wrap="square" rtlCol="1">
+                <a:spAutoFit/>
+              </a:bodyPr>
+              <a:lstStyle/>
+              <a:p>
+                <a:r>
+                  <a:rPr lang="en-US" sz="1200" dirty="0"/>
+                  <a:t>Calculate Reward</a:t>
+                </a:r>
+                <a:endParaRPr lang="he-IL" sz="1200" dirty="0"/>
+              </a:p>
+            </p:txBody>
+          </p:sp>
+        </p:grpSp>
+        <p:grpSp>
+          <p:nvGrpSpPr>
+            <p:cNvPr id="99" name="Group 98">
+              <a:extLst>
+                <a:ext uri="{FF2B5EF4-FFF2-40B4-BE49-F238E27FC236}">
+                  <a16:creationId xmlns:a16="http://schemas.microsoft.com/office/drawing/2014/main" id="{D2CB839A-F263-4A41-8879-04641F603980}"/>
+                </a:ext>
+              </a:extLst>
+            </p:cNvPr>
+            <p:cNvGrpSpPr/>
+            <p:nvPr/>
+          </p:nvGrpSpPr>
+          <p:grpSpPr>
+            <a:xfrm>
+              <a:off x="5453423" y="1153403"/>
+              <a:ext cx="1389415" cy="865148"/>
+              <a:chOff x="5274476" y="3134684"/>
+              <a:chExt cx="1389415" cy="865148"/>
+            </a:xfrm>
+          </p:grpSpPr>
+          <p:cxnSp>
+            <p:nvCxnSpPr>
+              <p:cNvPr id="100" name="Straight Arrow Connector 99">
+                <a:extLst>
+                  <a:ext uri="{FF2B5EF4-FFF2-40B4-BE49-F238E27FC236}">
+                    <a16:creationId xmlns:a16="http://schemas.microsoft.com/office/drawing/2014/main" id="{6DDE7425-CFF5-4E6A-8C9D-6653C85A1EDE}"/>
+                  </a:ext>
+                </a:extLst>
+              </p:cNvPr>
+              <p:cNvCxnSpPr>
+                <a:cxnSpLocks/>
+                <a:stCxn id="18" idx="0"/>
+                <a:endCxn id="46" idx="2"/>
+              </p:cNvCxnSpPr>
+              <p:nvPr/>
+            </p:nvCxnSpPr>
+            <p:spPr>
+              <a:xfrm flipH="1" flipV="1">
+                <a:off x="5350895" y="3134684"/>
+                <a:ext cx="652" cy="865148"/>
+              </a:xfrm>
+              <a:prstGeom prst="straightConnector1">
+                <a:avLst/>
+              </a:prstGeom>
+              <a:ln w="28575">
+                <a:headEnd type="triangle" w="med" len="med"/>
+                <a:tailEnd type="triangle" w="med" len="med"/>
+              </a:ln>
+            </p:spPr>
+            <p:style>
+              <a:lnRef idx="1">
+                <a:schemeClr val="accent1"/>
+              </a:lnRef>
+              <a:fillRef idx="0">
+                <a:schemeClr val="accent1"/>
+              </a:fillRef>
+              <a:effectRef idx="0">
+                <a:schemeClr val="accent1"/>
+              </a:effectRef>
+              <a:fontRef idx="minor">
+                <a:schemeClr val="tx1"/>
+              </a:fontRef>
+            </p:style>
+          </p:cxnSp>
+          <p:sp>
+            <p:nvSpPr>
+              <p:cNvPr id="101" name="TextBox 100">
+                <a:extLst>
+                  <a:ext uri="{FF2B5EF4-FFF2-40B4-BE49-F238E27FC236}">
+                    <a16:creationId xmlns:a16="http://schemas.microsoft.com/office/drawing/2014/main" id="{18D22938-9504-4697-9C92-91C9C24D889A}"/>
+                  </a:ext>
+                </a:extLst>
+              </p:cNvPr>
+              <p:cNvSpPr txBox="1"/>
+              <p:nvPr/>
+            </p:nvSpPr>
+            <p:spPr>
+              <a:xfrm>
+                <a:off x="5274476" y="3201567"/>
+                <a:ext cx="1389415" cy="461665"/>
+              </a:xfrm>
+              <a:prstGeom prst="rect">
+                <a:avLst/>
+              </a:prstGeom>
+              <a:noFill/>
+            </p:spPr>
+            <p:txBody>
+              <a:bodyPr wrap="square" rtlCol="1">
+                <a:spAutoFit/>
+              </a:bodyPr>
+              <a:lstStyle/>
+              <a:p>
+                <a:r>
+                  <a:rPr lang="en-US" sz="1200" dirty="0"/>
+                  <a:t>Initialize, Random Obstacles</a:t>
+                </a:r>
+                <a:endParaRPr lang="he-IL" sz="1200" dirty="0"/>
+              </a:p>
+            </p:txBody>
+          </p:sp>
+        </p:grpSp>
+        <p:grpSp>
+          <p:nvGrpSpPr>
+            <p:cNvPr id="104" name="Group 103">
+              <a:extLst>
+                <a:ext uri="{FF2B5EF4-FFF2-40B4-BE49-F238E27FC236}">
+                  <a16:creationId xmlns:a16="http://schemas.microsoft.com/office/drawing/2014/main" id="{D14E4AF2-B834-403F-8E53-E0545C20F0DA}"/>
+                </a:ext>
+              </a:extLst>
+            </p:cNvPr>
+            <p:cNvGrpSpPr/>
+            <p:nvPr/>
+          </p:nvGrpSpPr>
+          <p:grpSpPr>
+            <a:xfrm>
+              <a:off x="6571353" y="3037239"/>
+              <a:ext cx="2146188" cy="1454079"/>
+              <a:chOff x="4857421" y="1980733"/>
+              <a:chExt cx="2146188" cy="1454079"/>
+            </a:xfrm>
+          </p:grpSpPr>
+          <p:cxnSp>
+            <p:nvCxnSpPr>
+              <p:cNvPr id="105" name="Straight Arrow Connector 104">
+                <a:extLst>
+                  <a:ext uri="{FF2B5EF4-FFF2-40B4-BE49-F238E27FC236}">
+                    <a16:creationId xmlns:a16="http://schemas.microsoft.com/office/drawing/2014/main" id="{5C9649FA-24F8-4FBF-95C2-2C5346EAEEC2}"/>
+                  </a:ext>
+                </a:extLst>
+              </p:cNvPr>
+              <p:cNvCxnSpPr>
+                <a:cxnSpLocks/>
+                <a:stCxn id="45" idx="3"/>
+                <a:endCxn id="41" idx="2"/>
+              </p:cNvCxnSpPr>
+              <p:nvPr/>
+            </p:nvCxnSpPr>
+            <p:spPr>
+              <a:xfrm flipV="1">
+                <a:off x="5471249" y="1980733"/>
+                <a:ext cx="1532360" cy="1454079"/>
+              </a:xfrm>
+              <a:prstGeom prst="straightConnector1">
+                <a:avLst/>
+              </a:prstGeom>
+              <a:ln w="28575">
+                <a:headEnd type="triangle" w="med" len="med"/>
+                <a:tailEnd type="triangle" w="med" len="med"/>
+              </a:ln>
+            </p:spPr>
+            <p:style>
+              <a:lnRef idx="1">
+                <a:schemeClr val="accent1"/>
+              </a:lnRef>
+              <a:fillRef idx="0">
+                <a:schemeClr val="accent1"/>
+              </a:fillRef>
+              <a:effectRef idx="0">
+                <a:schemeClr val="accent1"/>
+              </a:effectRef>
+              <a:fontRef idx="minor">
+                <a:schemeClr val="tx1"/>
+              </a:fontRef>
+            </p:style>
+          </p:cxnSp>
+          <p:sp>
+            <p:nvSpPr>
+              <p:cNvPr id="106" name="TextBox 105">
+                <a:extLst>
+                  <a:ext uri="{FF2B5EF4-FFF2-40B4-BE49-F238E27FC236}">
+                    <a16:creationId xmlns:a16="http://schemas.microsoft.com/office/drawing/2014/main" id="{5320D525-6DE5-46F0-A20E-EDA85C8A9D59}"/>
+                  </a:ext>
+                </a:extLst>
+              </p:cNvPr>
+              <p:cNvSpPr txBox="1"/>
+              <p:nvPr/>
+            </p:nvSpPr>
+            <p:spPr>
+              <a:xfrm>
+                <a:off x="4857421" y="2763686"/>
+                <a:ext cx="1389415" cy="276999"/>
+              </a:xfrm>
+              <a:prstGeom prst="rect">
+                <a:avLst/>
+              </a:prstGeom>
+              <a:noFill/>
+            </p:spPr>
+            <p:txBody>
+              <a:bodyPr wrap="square" rtlCol="1">
+                <a:spAutoFit/>
+              </a:bodyPr>
+              <a:lstStyle/>
+              <a:p>
+                <a:r>
+                  <a:rPr lang="en-US" sz="1200" dirty="0"/>
+                  <a:t>Send car input</a:t>
+                </a:r>
+                <a:endParaRPr lang="he-IL" sz="1200" dirty="0"/>
+              </a:p>
+            </p:txBody>
+          </p:sp>
+        </p:grpSp>
+        <p:grpSp>
+          <p:nvGrpSpPr>
+            <p:cNvPr id="121" name="Group 120">
+              <a:extLst>
+                <a:ext uri="{FF2B5EF4-FFF2-40B4-BE49-F238E27FC236}">
+                  <a16:creationId xmlns:a16="http://schemas.microsoft.com/office/drawing/2014/main" id="{2EBEFF61-EF87-4578-8739-E423187BF527}"/>
+                </a:ext>
+              </a:extLst>
+            </p:cNvPr>
+            <p:cNvGrpSpPr/>
+            <p:nvPr/>
+          </p:nvGrpSpPr>
+          <p:grpSpPr>
+            <a:xfrm>
+              <a:off x="6044546" y="5810341"/>
+              <a:ext cx="1603020" cy="276999"/>
+              <a:chOff x="1160889" y="4730311"/>
+              <a:chExt cx="1603020" cy="276999"/>
+            </a:xfrm>
+          </p:grpSpPr>
+          <p:cxnSp>
+            <p:nvCxnSpPr>
+              <p:cNvPr id="122" name="Straight Arrow Connector 121">
+                <a:extLst>
+                  <a:ext uri="{FF2B5EF4-FFF2-40B4-BE49-F238E27FC236}">
+                    <a16:creationId xmlns:a16="http://schemas.microsoft.com/office/drawing/2014/main" id="{D0C2C323-2AC9-4F90-89FC-4E537F4D7A95}"/>
+                  </a:ext>
+                </a:extLst>
+              </p:cNvPr>
+              <p:cNvCxnSpPr>
+                <a:cxnSpLocks/>
+                <a:stCxn id="43" idx="3"/>
+                <a:endCxn id="13" idx="1"/>
+              </p:cNvCxnSpPr>
+              <p:nvPr/>
+            </p:nvCxnSpPr>
+            <p:spPr>
+              <a:xfrm>
+                <a:off x="1160889" y="4984227"/>
+                <a:ext cx="1596584" cy="330"/>
+              </a:xfrm>
+              <a:prstGeom prst="straightConnector1">
+                <a:avLst/>
+              </a:prstGeom>
+              <a:ln w="28575">
+                <a:headEnd type="none" w="med" len="med"/>
+                <a:tailEnd type="triangle" w="med" len="med"/>
+              </a:ln>
+            </p:spPr>
+            <p:style>
+              <a:lnRef idx="1">
+                <a:schemeClr val="accent1"/>
+              </a:lnRef>
+              <a:fillRef idx="0">
+                <a:schemeClr val="accent1"/>
+              </a:fillRef>
+              <a:effectRef idx="0">
+                <a:schemeClr val="accent1"/>
+              </a:effectRef>
+              <a:fontRef idx="minor">
+                <a:schemeClr val="tx1"/>
+              </a:fontRef>
+            </p:style>
+          </p:cxnSp>
+          <p:sp>
+            <p:nvSpPr>
+              <p:cNvPr id="123" name="TextBox 122">
+                <a:extLst>
+                  <a:ext uri="{FF2B5EF4-FFF2-40B4-BE49-F238E27FC236}">
+                    <a16:creationId xmlns:a16="http://schemas.microsoft.com/office/drawing/2014/main" id="{5D533E44-60B7-47A2-AB74-E5BCF8791B61}"/>
+                  </a:ext>
+                </a:extLst>
+              </p:cNvPr>
+              <p:cNvSpPr txBox="1"/>
+              <p:nvPr/>
+            </p:nvSpPr>
+            <p:spPr>
+              <a:xfrm>
+                <a:off x="1374494" y="4730311"/>
+                <a:ext cx="1389415" cy="276999"/>
+              </a:xfrm>
+              <a:prstGeom prst="rect">
+                <a:avLst/>
+              </a:prstGeom>
+              <a:noFill/>
+            </p:spPr>
+            <p:txBody>
+              <a:bodyPr wrap="square" rtlCol="1">
+                <a:spAutoFit/>
+              </a:bodyPr>
+              <a:lstStyle/>
+              <a:p>
+                <a:r>
+                  <a:rPr lang="en-US" sz="1200" dirty="0"/>
+                  <a:t>Checkpoint Trigger</a:t>
+                </a:r>
+                <a:endParaRPr lang="he-IL" sz="1200" dirty="0"/>
+              </a:p>
+            </p:txBody>
+          </p:sp>
+        </p:grpSp>
+        <p:grpSp>
+          <p:nvGrpSpPr>
+            <p:cNvPr id="126" name="Group 125">
+              <a:extLst>
+                <a:ext uri="{FF2B5EF4-FFF2-40B4-BE49-F238E27FC236}">
+                  <a16:creationId xmlns:a16="http://schemas.microsoft.com/office/drawing/2014/main" id="{4897C390-4157-4270-8755-7A6C0FD18C5A}"/>
+                </a:ext>
+              </a:extLst>
+            </p:cNvPr>
+            <p:cNvGrpSpPr/>
+            <p:nvPr/>
+          </p:nvGrpSpPr>
+          <p:grpSpPr>
+            <a:xfrm>
+              <a:off x="8717541" y="3037239"/>
+              <a:ext cx="1660767" cy="2827292"/>
+              <a:chOff x="2202164" y="3098719"/>
+              <a:chExt cx="1660767" cy="2827292"/>
+            </a:xfrm>
+          </p:grpSpPr>
+          <p:cxnSp>
+            <p:nvCxnSpPr>
+              <p:cNvPr id="127" name="Straight Arrow Connector 126">
+                <a:extLst>
+                  <a:ext uri="{FF2B5EF4-FFF2-40B4-BE49-F238E27FC236}">
+                    <a16:creationId xmlns:a16="http://schemas.microsoft.com/office/drawing/2014/main" id="{10E4F2F6-A0E3-47B8-B3E6-3DC4B3E27809}"/>
+                  </a:ext>
+                </a:extLst>
+              </p:cNvPr>
+              <p:cNvCxnSpPr>
+                <a:cxnSpLocks/>
+                <a:stCxn id="13" idx="0"/>
+                <a:endCxn id="41" idx="2"/>
+              </p:cNvCxnSpPr>
+              <p:nvPr/>
+            </p:nvCxnSpPr>
+            <p:spPr>
+              <a:xfrm flipH="1" flipV="1">
+                <a:off x="2202164" y="3098719"/>
+                <a:ext cx="36619" cy="2827292"/>
+              </a:xfrm>
+              <a:prstGeom prst="straightConnector1">
+                <a:avLst/>
+              </a:prstGeom>
+              <a:ln w="28575">
+                <a:headEnd type="none" w="med" len="med"/>
+                <a:tailEnd type="triangle" w="med" len="med"/>
+              </a:ln>
+            </p:spPr>
+            <p:style>
+              <a:lnRef idx="1">
+                <a:schemeClr val="accent1"/>
+              </a:lnRef>
+              <a:fillRef idx="0">
+                <a:schemeClr val="accent1"/>
+              </a:fillRef>
+              <a:effectRef idx="0">
+                <a:schemeClr val="accent1"/>
+              </a:effectRef>
+              <a:fontRef idx="minor">
+                <a:schemeClr val="tx1"/>
+              </a:fontRef>
+            </p:style>
+          </p:cxnSp>
+          <p:sp>
+            <p:nvSpPr>
+              <p:cNvPr id="128" name="TextBox 127">
+                <a:extLst>
+                  <a:ext uri="{FF2B5EF4-FFF2-40B4-BE49-F238E27FC236}">
+                    <a16:creationId xmlns:a16="http://schemas.microsoft.com/office/drawing/2014/main" id="{E43ECEB7-93B4-4F3B-BE48-F9E9BD7BFD72}"/>
+                  </a:ext>
+                </a:extLst>
+              </p:cNvPr>
+              <p:cNvSpPr txBox="1"/>
+              <p:nvPr/>
+            </p:nvSpPr>
+            <p:spPr>
+              <a:xfrm>
+                <a:off x="2251656" y="5242065"/>
+                <a:ext cx="1611275" cy="461665"/>
+              </a:xfrm>
+              <a:prstGeom prst="rect">
+                <a:avLst/>
+              </a:prstGeom>
+              <a:noFill/>
+            </p:spPr>
+            <p:txBody>
+              <a:bodyPr wrap="square" rtlCol="1">
+                <a:spAutoFit/>
+              </a:bodyPr>
+              <a:lstStyle/>
+              <a:p>
+                <a:r>
+                  <a:rPr lang="en-US" sz="1200" dirty="0"/>
+                  <a:t>Checkpoint Trigger + Checkpoint Locations</a:t>
+                </a:r>
+                <a:endParaRPr lang="he-IL" sz="1200" dirty="0"/>
+              </a:p>
+            </p:txBody>
+          </p:sp>
+        </p:grpSp>
+        <p:grpSp>
+          <p:nvGrpSpPr>
+            <p:cNvPr id="131" name="Group 130">
+              <a:extLst>
+                <a:ext uri="{FF2B5EF4-FFF2-40B4-BE49-F238E27FC236}">
+                  <a16:creationId xmlns:a16="http://schemas.microsoft.com/office/drawing/2014/main" id="{D325FE97-101B-4C81-BD61-7F241FC2B9D4}"/>
+                </a:ext>
+              </a:extLst>
+            </p:cNvPr>
+            <p:cNvGrpSpPr/>
+            <p:nvPr/>
+          </p:nvGrpSpPr>
+          <p:grpSpPr>
+            <a:xfrm>
+              <a:off x="6304199" y="1940597"/>
+              <a:ext cx="1523750" cy="276999"/>
+              <a:chOff x="3990436" y="4316344"/>
+              <a:chExt cx="1523750" cy="276999"/>
+            </a:xfrm>
+          </p:grpSpPr>
+          <p:cxnSp>
+            <p:nvCxnSpPr>
+              <p:cNvPr id="132" name="Straight Arrow Connector 131">
+                <a:extLst>
+                  <a:ext uri="{FF2B5EF4-FFF2-40B4-BE49-F238E27FC236}">
+                    <a16:creationId xmlns:a16="http://schemas.microsoft.com/office/drawing/2014/main" id="{28E65BC4-01B3-40CF-8218-098902ADA663}"/>
+                  </a:ext>
+                </a:extLst>
+              </p:cNvPr>
+              <p:cNvCxnSpPr>
+                <a:cxnSpLocks/>
+                <a:stCxn id="18" idx="3"/>
+                <a:endCxn id="42" idx="1"/>
+              </p:cNvCxnSpPr>
+              <p:nvPr/>
+            </p:nvCxnSpPr>
+            <p:spPr>
+              <a:xfrm>
+                <a:off x="3990436" y="4578964"/>
+                <a:ext cx="1300889" cy="0"/>
+              </a:xfrm>
+              <a:prstGeom prst="straightConnector1">
+                <a:avLst/>
+              </a:prstGeom>
+              <a:ln w="28575">
+                <a:headEnd type="triangle" w="med" len="med"/>
+                <a:tailEnd type="triangle" w="med" len="med"/>
+              </a:ln>
+            </p:spPr>
+            <p:style>
+              <a:lnRef idx="1">
+                <a:schemeClr val="accent1"/>
+              </a:lnRef>
+              <a:fillRef idx="0">
+                <a:schemeClr val="accent1"/>
+              </a:fillRef>
+              <a:effectRef idx="0">
+                <a:schemeClr val="accent1"/>
+              </a:effectRef>
+              <a:fontRef idx="minor">
+                <a:schemeClr val="tx1"/>
+              </a:fontRef>
+            </p:style>
+          </p:cxnSp>
+          <p:sp>
+            <p:nvSpPr>
+              <p:cNvPr id="133" name="TextBox 132">
+                <a:extLst>
+                  <a:ext uri="{FF2B5EF4-FFF2-40B4-BE49-F238E27FC236}">
+                    <a16:creationId xmlns:a16="http://schemas.microsoft.com/office/drawing/2014/main" id="{8CB6D00A-3E8B-42D3-A62F-24E739E670E3}"/>
+                  </a:ext>
+                </a:extLst>
+              </p:cNvPr>
+              <p:cNvSpPr txBox="1"/>
+              <p:nvPr/>
+            </p:nvSpPr>
+            <p:spPr>
+              <a:xfrm>
+                <a:off x="4124771" y="4316344"/>
+                <a:ext cx="1389415" cy="276999"/>
+              </a:xfrm>
+              <a:prstGeom prst="rect">
+                <a:avLst/>
+              </a:prstGeom>
+              <a:noFill/>
+            </p:spPr>
+            <p:txBody>
+              <a:bodyPr wrap="square" rtlCol="1">
+                <a:spAutoFit/>
+              </a:bodyPr>
+              <a:lstStyle/>
+              <a:p>
+                <a:r>
+                  <a:rPr lang="en-US" sz="1200" dirty="0"/>
+                  <a:t>Initialize Agents</a:t>
+                </a:r>
+                <a:endParaRPr lang="he-IL" sz="1200" dirty="0"/>
+              </a:p>
+            </p:txBody>
+          </p:sp>
+        </p:grpSp>
+        <p:grpSp>
+          <p:nvGrpSpPr>
+            <p:cNvPr id="136" name="Group 135">
+              <a:extLst>
+                <a:ext uri="{FF2B5EF4-FFF2-40B4-BE49-F238E27FC236}">
+                  <a16:creationId xmlns:a16="http://schemas.microsoft.com/office/drawing/2014/main" id="{07EA21EF-4475-4D3A-9B07-801AA67E563D}"/>
+                </a:ext>
+              </a:extLst>
+            </p:cNvPr>
+            <p:cNvGrpSpPr/>
+            <p:nvPr/>
+          </p:nvGrpSpPr>
+          <p:grpSpPr>
+            <a:xfrm>
+              <a:off x="8684483" y="2387883"/>
+              <a:ext cx="2993121" cy="281929"/>
+              <a:chOff x="5710572" y="3860353"/>
+              <a:chExt cx="2993121" cy="281929"/>
+            </a:xfrm>
+          </p:grpSpPr>
+          <p:cxnSp>
+            <p:nvCxnSpPr>
+              <p:cNvPr id="137" name="Straight Arrow Connector 136">
+                <a:extLst>
+                  <a:ext uri="{FF2B5EF4-FFF2-40B4-BE49-F238E27FC236}">
+                    <a16:creationId xmlns:a16="http://schemas.microsoft.com/office/drawing/2014/main" id="{6E9A121E-E3CF-4F2E-8BAA-E529BA1F1579}"/>
+                  </a:ext>
+                </a:extLst>
+              </p:cNvPr>
+              <p:cNvCxnSpPr>
+                <a:cxnSpLocks/>
+                <a:stCxn id="41" idx="0"/>
+                <a:endCxn id="42" idx="2"/>
+              </p:cNvCxnSpPr>
+              <p:nvPr/>
+            </p:nvCxnSpPr>
+            <p:spPr>
+              <a:xfrm flipH="1" flipV="1">
+                <a:off x="5743245" y="3860353"/>
+                <a:ext cx="385" cy="280024"/>
+              </a:xfrm>
+              <a:prstGeom prst="straightConnector1">
+                <a:avLst/>
+              </a:prstGeom>
+              <a:ln w="28575">
+                <a:headEnd type="triangle" w="med" len="med"/>
+                <a:tailEnd type="triangle" w="med" len="med"/>
+              </a:ln>
+            </p:spPr>
+            <p:style>
+              <a:lnRef idx="1">
+                <a:schemeClr val="accent1"/>
+              </a:lnRef>
+              <a:fillRef idx="0">
+                <a:schemeClr val="accent1"/>
+              </a:fillRef>
+              <a:effectRef idx="0">
+                <a:schemeClr val="accent1"/>
+              </a:effectRef>
+              <a:fontRef idx="minor">
+                <a:schemeClr val="tx1"/>
+              </a:fontRef>
+            </p:style>
+          </p:cxnSp>
+          <p:sp>
+            <p:nvSpPr>
+              <p:cNvPr id="138" name="TextBox 137">
+                <a:extLst>
+                  <a:ext uri="{FF2B5EF4-FFF2-40B4-BE49-F238E27FC236}">
+                    <a16:creationId xmlns:a16="http://schemas.microsoft.com/office/drawing/2014/main" id="{41291059-2F9B-455C-954E-A51F91BB499F}"/>
+                  </a:ext>
+                </a:extLst>
+              </p:cNvPr>
+              <p:cNvSpPr txBox="1"/>
+              <p:nvPr/>
+            </p:nvSpPr>
+            <p:spPr>
+              <a:xfrm>
+                <a:off x="5710572" y="3865283"/>
+                <a:ext cx="2993121" cy="276999"/>
+              </a:xfrm>
+              <a:prstGeom prst="rect">
+                <a:avLst/>
+              </a:prstGeom>
+              <a:noFill/>
+            </p:spPr>
+            <p:txBody>
+              <a:bodyPr wrap="square" rtlCol="1">
+                <a:spAutoFit/>
+              </a:bodyPr>
+              <a:lstStyle/>
+              <a:p>
+                <a:r>
+                  <a:rPr lang="en-US" sz="1200" dirty="0"/>
+                  <a:t>Initialization. Environment  Info</a:t>
+                </a:r>
+              </a:p>
+            </p:txBody>
+          </p:sp>
+        </p:grpSp>
       </p:grpSp>
     </p:spTree>
     <p:extLst>
       <p:ext uri="{BB962C8B-B14F-4D97-AF65-F5344CB8AC3E}">
-        <p14:creationId xmlns:p14="http://schemas.microsoft.com/office/powerpoint/2010/main" val="1626896277"/>
+        <p14:creationId xmlns:p14="http://schemas.microsoft.com/office/powerpoint/2010/main" val="3343744118"/>
       </p:ext>
     </p:extLst>
   </p:cSld>

</xml_diff>